<commit_message>
Map and powerpoint update
I used crayons on the map. Don't judge.
</commit_message>
<xml_diff>
--- a/CST205 - Final Project Powerpoint.pptx
+++ b/CST205 - Final Project Powerpoint.pptx
@@ -8,9 +8,10 @@
     <p:sldId id="256" r:id="rId2"/>
     <p:sldId id="257" r:id="rId3"/>
     <p:sldId id="258" r:id="rId4"/>
-    <p:sldId id="259" r:id="rId5"/>
-    <p:sldId id="260" r:id="rId6"/>
-    <p:sldId id="261" r:id="rId7"/>
+    <p:sldId id="262" r:id="rId5"/>
+    <p:sldId id="259" r:id="rId6"/>
+    <p:sldId id="260" r:id="rId7"/>
+    <p:sldId id="261" r:id="rId8"/>
   </p:sldIdLst>
   <p:sldSz cx="12192000" cy="6858000"/>
   <p:notesSz cx="6858000" cy="9144000"/>
@@ -109,6 +110,11 @@
       </a:defRPr>
     </a:lvl9pPr>
   </p:defaultTextStyle>
+  <p:extLst>
+    <p:ext uri="{EFAFB233-063F-42B5-8137-9DF3F51BA10A}">
+      <p15:sldGuideLst xmlns:p15="http://schemas.microsoft.com/office/powerpoint/2012/main"/>
+    </p:ext>
+  </p:extLst>
 </p:presentation>
 </file>
 
@@ -282,7 +288,7 @@
           <a:p>
             <a:fld id="{CBEA0315-3FFD-4CEB-B15A-57C2284689D6}" type="datetimeFigureOut">
               <a:rPr lang="en-US" smtClean="0"/>
-              <a:t>12/6/2014</a:t>
+              <a:t>12/15/2014</a:t>
             </a:fld>
             <a:endParaRPr lang="en-US"/>
           </a:p>
@@ -549,7 +555,7 @@
           <a:p>
             <a:fld id="{CBEA0315-3FFD-4CEB-B15A-57C2284689D6}" type="datetimeFigureOut">
               <a:rPr lang="en-US" smtClean="0"/>
-              <a:t>12/6/2014</a:t>
+              <a:t>12/15/2014</a:t>
             </a:fld>
             <a:endParaRPr lang="en-US"/>
           </a:p>
@@ -780,7 +786,7 @@
           <a:p>
             <a:fld id="{CBEA0315-3FFD-4CEB-B15A-57C2284689D6}" type="datetimeFigureOut">
               <a:rPr lang="en-US" smtClean="0"/>
-              <a:t>12/6/2014</a:t>
+              <a:t>12/15/2014</a:t>
             </a:fld>
             <a:endParaRPr lang="en-US"/>
           </a:p>
@@ -1090,7 +1096,7 @@
           <a:p>
             <a:fld id="{CBEA0315-3FFD-4CEB-B15A-57C2284689D6}" type="datetimeFigureOut">
               <a:rPr lang="en-US" smtClean="0"/>
-              <a:t>12/6/2014</a:t>
+              <a:t>12/15/2014</a:t>
             </a:fld>
             <a:endParaRPr lang="en-US"/>
           </a:p>
@@ -1563,7 +1569,7 @@
           <a:p>
             <a:fld id="{CBEA0315-3FFD-4CEB-B15A-57C2284689D6}" type="datetimeFigureOut">
               <a:rPr lang="en-US" smtClean="0"/>
-              <a:t>12/6/2014</a:t>
+              <a:t>12/15/2014</a:t>
             </a:fld>
             <a:endParaRPr lang="en-US"/>
           </a:p>
@@ -2110,7 +2116,7 @@
           <a:p>
             <a:fld id="{CBEA0315-3FFD-4CEB-B15A-57C2284689D6}" type="datetimeFigureOut">
               <a:rPr lang="en-US" smtClean="0"/>
-              <a:t>12/6/2014</a:t>
+              <a:t>12/15/2014</a:t>
             </a:fld>
             <a:endParaRPr lang="en-US"/>
           </a:p>
@@ -2884,7 +2890,7 @@
           <a:p>
             <a:fld id="{CBEA0315-3FFD-4CEB-B15A-57C2284689D6}" type="datetimeFigureOut">
               <a:rPr lang="en-US" smtClean="0"/>
-              <a:t>12/6/2014</a:t>
+              <a:t>12/15/2014</a:t>
             </a:fld>
             <a:endParaRPr lang="en-US"/>
           </a:p>
@@ -3059,7 +3065,7 @@
           <a:p>
             <a:fld id="{CBEA0315-3FFD-4CEB-B15A-57C2284689D6}" type="datetimeFigureOut">
               <a:rPr lang="en-US" smtClean="0"/>
-              <a:t>12/6/2014</a:t>
+              <a:t>12/15/2014</a:t>
             </a:fld>
             <a:endParaRPr lang="en-US"/>
           </a:p>
@@ -3282,7 +3288,7 @@
           <a:p>
             <a:fld id="{CBEA0315-3FFD-4CEB-B15A-57C2284689D6}" type="datetimeFigureOut">
               <a:rPr lang="en-US" smtClean="0"/>
-              <a:t>12/6/2014</a:t>
+              <a:t>12/15/2014</a:t>
             </a:fld>
             <a:endParaRPr lang="en-US"/>
           </a:p>
@@ -3462,7 +3468,7 @@
           <a:p>
             <a:fld id="{CBEA0315-3FFD-4CEB-B15A-57C2284689D6}" type="datetimeFigureOut">
               <a:rPr lang="en-US" smtClean="0"/>
-              <a:t>12/6/2014</a:t>
+              <a:t>12/15/2014</a:t>
             </a:fld>
             <a:endParaRPr lang="en-US"/>
           </a:p>
@@ -3751,7 +3757,7 @@
           <a:p>
             <a:fld id="{CBEA0315-3FFD-4CEB-B15A-57C2284689D6}" type="datetimeFigureOut">
               <a:rPr lang="en-US" smtClean="0"/>
-              <a:t>12/6/2014</a:t>
+              <a:t>12/15/2014</a:t>
             </a:fld>
             <a:endParaRPr lang="en-US"/>
           </a:p>
@@ -3993,7 +3999,7 @@
           <a:p>
             <a:fld id="{CBEA0315-3FFD-4CEB-B15A-57C2284689D6}" type="datetimeFigureOut">
               <a:rPr lang="en-US" smtClean="0"/>
-              <a:t>12/6/2014</a:t>
+              <a:t>12/15/2014</a:t>
             </a:fld>
             <a:endParaRPr lang="en-US"/>
           </a:p>
@@ -4372,7 +4378,7 @@
           <a:p>
             <a:fld id="{CBEA0315-3FFD-4CEB-B15A-57C2284689D6}" type="datetimeFigureOut">
               <a:rPr lang="en-US" smtClean="0"/>
-              <a:t>12/6/2014</a:t>
+              <a:t>12/15/2014</a:t>
             </a:fld>
             <a:endParaRPr lang="en-US"/>
           </a:p>
@@ -4490,7 +4496,7 @@
           <a:p>
             <a:fld id="{CBEA0315-3FFD-4CEB-B15A-57C2284689D6}" type="datetimeFigureOut">
               <a:rPr lang="en-US" smtClean="0"/>
-              <a:t>12/6/2014</a:t>
+              <a:t>12/15/2014</a:t>
             </a:fld>
             <a:endParaRPr lang="en-US"/>
           </a:p>
@@ -4585,7 +4591,7 @@
           <a:p>
             <a:fld id="{CBEA0315-3FFD-4CEB-B15A-57C2284689D6}" type="datetimeFigureOut">
               <a:rPr lang="en-US" smtClean="0"/>
-              <a:t>12/6/2014</a:t>
+              <a:t>12/15/2014</a:t>
             </a:fld>
             <a:endParaRPr lang="en-US"/>
           </a:p>
@@ -4834,7 +4840,7 @@
           <a:p>
             <a:fld id="{CBEA0315-3FFD-4CEB-B15A-57C2284689D6}" type="datetimeFigureOut">
               <a:rPr lang="en-US" smtClean="0"/>
-              <a:t>12/6/2014</a:t>
+              <a:t>12/15/2014</a:t>
             </a:fld>
             <a:endParaRPr lang="en-US"/>
           </a:p>
@@ -5091,7 +5097,7 @@
           <a:p>
             <a:fld id="{CBEA0315-3FFD-4CEB-B15A-57C2284689D6}" type="datetimeFigureOut">
               <a:rPr lang="en-US" smtClean="0"/>
-              <a:t>12/6/2014</a:t>
+              <a:t>12/15/2014</a:t>
             </a:fld>
             <a:endParaRPr lang="en-US"/>
           </a:p>
@@ -5334,7 +5340,7 @@
           <a:p>
             <a:fld id="{CBEA0315-3FFD-4CEB-B15A-57C2284689D6}" type="datetimeFigureOut">
               <a:rPr lang="en-US" smtClean="0"/>
-              <a:t>12/6/2014</a:t>
+              <a:t>12/15/2014</a:t>
             </a:fld>
             <a:endParaRPr lang="en-US"/>
           </a:p>
@@ -5760,7 +5766,11 @@
           <a:bodyPr/>
           <a:lstStyle/>
           <a:p>
-            <a:endParaRPr lang="en-US"/>
+            <a:r>
+              <a:rPr lang="en-US" dirty="0" smtClean="0"/>
+              <a:t>The Adventures of Malice in Py-Land</a:t>
+            </a:r>
+            <a:endParaRPr lang="en-US" dirty="0"/>
           </a:p>
         </p:txBody>
       </p:sp>
@@ -5876,8 +5886,37 @@
           <a:p>
             <a:r>
               <a:rPr lang="en-US" dirty="0"/>
-              <a:t>Objective - what are you planning to accomplish for the final project?</a:t>
-            </a:r>
+              <a:t>Objective - what are you planning to accomplish for the final project</a:t>
+            </a:r>
+            <a:r>
+              <a:rPr lang="en-US" dirty="0" smtClean="0"/>
+              <a:t>?</a:t>
+            </a:r>
+          </a:p>
+          <a:p>
+            <a:r>
+              <a:rPr lang="en-US" dirty="0" smtClean="0"/>
+              <a:t>With this project, the intent is to create a text-based game in which Malice is dropped into Py-Land.</a:t>
+            </a:r>
+          </a:p>
+          <a:p>
+            <a:r>
+              <a:rPr lang="en-US" dirty="0" smtClean="0"/>
+              <a:t>In each area of the map, she must make a choice, and that choice determines what happens to the map.</a:t>
+            </a:r>
+          </a:p>
+          <a:p>
+            <a:r>
+              <a:rPr lang="en-US" dirty="0" smtClean="0"/>
+              <a:t>This will be put into effect by use of picture functions, distorting what the area would have been.</a:t>
+            </a:r>
+          </a:p>
+          <a:p>
+            <a:r>
+              <a:rPr lang="en-US" dirty="0" smtClean="0"/>
+              <a:t>An image will be attached to each ‘room’, and it will display to the screen what her choice has done.</a:t>
+            </a:r>
+            <a:endParaRPr lang="en-US" dirty="0"/>
           </a:p>
         </p:txBody>
       </p:sp>
@@ -5950,9 +5989,32 @@
           <a:lstStyle/>
           <a:p>
             <a:r>
-              <a:rPr lang="en-US" dirty="0"/>
-              <a:t>Approach - what approach have you taken towards the objective? who is working on what?</a:t>
-            </a:r>
+              <a:rPr lang="en-US" dirty="0" smtClean="0"/>
+              <a:t>We started our project by drawing a map.</a:t>
+            </a:r>
+          </a:p>
+          <a:p>
+            <a:r>
+              <a:rPr lang="en-US" dirty="0" smtClean="0"/>
+              <a:t>The map was then color-coded and </a:t>
+            </a:r>
+            <a:r>
+              <a:rPr lang="en-US" dirty="0" smtClean="0"/>
+              <a:t>it was decided what would happen in each area.</a:t>
+            </a:r>
+          </a:p>
+          <a:p>
+            <a:r>
+              <a:rPr lang="en-US" dirty="0" smtClean="0"/>
+              <a:t>Luciano drew up the map, while Caitlin added in the additional information.</a:t>
+            </a:r>
+          </a:p>
+          <a:p>
+            <a:r>
+              <a:rPr lang="en-US" dirty="0" smtClean="0"/>
+              <a:t>Coding was done both individually and together, with image effect functions being put together mostly by one person and text game statements put together by the other.</a:t>
+            </a:r>
+            <a:endParaRPr lang="en-US" dirty="0"/>
           </a:p>
         </p:txBody>
       </p:sp>
@@ -6003,38 +6065,49 @@
           <a:p>
             <a:r>
               <a:rPr lang="en-US" dirty="0" smtClean="0"/>
-              <a:t>Results</a:t>
+              <a:t>Initial </a:t>
+            </a:r>
+            <a:r>
+              <a:rPr lang="en-US" dirty="0" err="1" smtClean="0"/>
+              <a:t>MapPing</a:t>
             </a:r>
             <a:endParaRPr lang="en-US" dirty="0"/>
           </a:p>
         </p:txBody>
       </p:sp>
-      <p:sp>
-        <p:nvSpPr>
-          <p:cNvPr id="3" name="Content Placeholder 2"/>
-          <p:cNvSpPr>
-            <a:spLocks noGrp="1"/>
-          </p:cNvSpPr>
+      <p:pic>
+        <p:nvPicPr>
+          <p:cNvPr id="4" name="Content Placeholder 3"/>
+          <p:cNvPicPr>
+            <a:picLocks noGrp="1" noChangeAspect="1"/>
+          </p:cNvPicPr>
           <p:nvPr>
             <p:ph idx="1"/>
           </p:nvPr>
-        </p:nvSpPr>
-        <p:spPr/>
-        <p:txBody>
-          <a:bodyPr/>
-          <a:lstStyle/>
-          <a:p>
-            <a:r>
-              <a:rPr lang="en-US" dirty="0"/>
-              <a:t>Results - what have you achieved so far? explain this for each individual team member.</a:t>
-            </a:r>
-          </a:p>
-        </p:txBody>
-      </p:sp>
+        </p:nvPicPr>
+        <p:blipFill>
+          <a:blip r:embed="rId2" cstate="print">
+            <a:extLst>
+              <a:ext uri="{28A0092B-C50C-407E-A947-70E740481C1C}">
+                <a14:useLocalDpi xmlns:a14="http://schemas.microsoft.com/office/drawing/2010/main" val="0"/>
+              </a:ext>
+            </a:extLst>
+          </a:blip>
+          <a:stretch>
+            <a:fillRect/>
+          </a:stretch>
+        </p:blipFill>
+        <p:spPr>
+          <a:xfrm>
+            <a:off x="2758230" y="2193925"/>
+            <a:ext cx="6675539" cy="4024313"/>
+          </a:xfrm>
+        </p:spPr>
+      </p:pic>
     </p:spTree>
     <p:extLst>
       <p:ext uri="{BB962C8B-B14F-4D97-AF65-F5344CB8AC3E}">
-        <p14:creationId xmlns:p14="http://schemas.microsoft.com/office/powerpoint/2010/main" val="370495716"/>
+        <p14:creationId xmlns:p14="http://schemas.microsoft.com/office/powerpoint/2010/main" val="1539846533"/>
       </p:ext>
     </p:extLst>
   </p:cSld>
@@ -6078,7 +6151,7 @@
           <a:p>
             <a:r>
               <a:rPr lang="en-US" dirty="0" smtClean="0"/>
-              <a:t>Demonstration</a:t>
+              <a:t>Results</a:t>
             </a:r>
             <a:endParaRPr lang="en-US" dirty="0"/>
           </a:p>
@@ -6101,7 +6174,7 @@
           <a:p>
             <a:r>
               <a:rPr lang="en-US" dirty="0"/>
-              <a:t>Demo - can you demonstrate anything? add screenshots of your application running with descriptions</a:t>
+              <a:t>Results - what have you achieved so far? explain this for each individual team member.</a:t>
             </a:r>
           </a:p>
         </p:txBody>
@@ -6109,7 +6182,7 @@
     </p:spTree>
     <p:extLst>
       <p:ext uri="{BB962C8B-B14F-4D97-AF65-F5344CB8AC3E}">
-        <p14:creationId xmlns:p14="http://schemas.microsoft.com/office/powerpoint/2010/main" val="4118866213"/>
+        <p14:creationId xmlns:p14="http://schemas.microsoft.com/office/powerpoint/2010/main" val="370495716"/>
       </p:ext>
     </p:extLst>
   </p:cSld>
@@ -6153,6 +6226,81 @@
           <a:p>
             <a:r>
               <a:rPr lang="en-US" dirty="0" smtClean="0"/>
+              <a:t>Demonstration</a:t>
+            </a:r>
+            <a:endParaRPr lang="en-US" dirty="0"/>
+          </a:p>
+        </p:txBody>
+      </p:sp>
+      <p:sp>
+        <p:nvSpPr>
+          <p:cNvPr id="3" name="Content Placeholder 2"/>
+          <p:cNvSpPr>
+            <a:spLocks noGrp="1"/>
+          </p:cNvSpPr>
+          <p:nvPr>
+            <p:ph idx="1"/>
+          </p:nvPr>
+        </p:nvSpPr>
+        <p:spPr/>
+        <p:txBody>
+          <a:bodyPr/>
+          <a:lstStyle/>
+          <a:p>
+            <a:r>
+              <a:rPr lang="en-US" dirty="0"/>
+              <a:t>Demo - can you demonstrate anything? add screenshots of your application running with descriptions</a:t>
+            </a:r>
+          </a:p>
+        </p:txBody>
+      </p:sp>
+    </p:spTree>
+    <p:extLst>
+      <p:ext uri="{BB962C8B-B14F-4D97-AF65-F5344CB8AC3E}">
+        <p14:creationId xmlns:p14="http://schemas.microsoft.com/office/powerpoint/2010/main" val="4118866213"/>
+      </p:ext>
+    </p:extLst>
+  </p:cSld>
+  <p:clrMapOvr>
+    <a:masterClrMapping/>
+  </p:clrMapOvr>
+</p:sld>
+</file>
+
+<file path=ppt/slides/slide7.xml><?xml version="1.0" encoding="utf-8"?>
+<p:sld xmlns:a="http://schemas.openxmlformats.org/drawingml/2006/main" xmlns:r="http://schemas.openxmlformats.org/officeDocument/2006/relationships" xmlns:p="http://schemas.openxmlformats.org/presentationml/2006/main">
+  <p:cSld>
+    <p:spTree>
+      <p:nvGrpSpPr>
+        <p:cNvPr id="1" name=""/>
+        <p:cNvGrpSpPr/>
+        <p:nvPr/>
+      </p:nvGrpSpPr>
+      <p:grpSpPr>
+        <a:xfrm>
+          <a:off x="0" y="0"/>
+          <a:ext cx="0" cy="0"/>
+          <a:chOff x="0" y="0"/>
+          <a:chExt cx="0" cy="0"/>
+        </a:xfrm>
+      </p:grpSpPr>
+      <p:sp>
+        <p:nvSpPr>
+          <p:cNvPr id="2" name="Title 1"/>
+          <p:cNvSpPr>
+            <a:spLocks noGrp="1"/>
+          </p:cNvSpPr>
+          <p:nvPr>
+            <p:ph type="title"/>
+          </p:nvPr>
+        </p:nvSpPr>
+        <p:spPr/>
+        <p:txBody>
+          <a:bodyPr/>
+          <a:lstStyle/>
+          <a:p>
+            <a:r>
+              <a:rPr lang="en-US" dirty="0" smtClean="0"/>
               <a:t>Top Three</a:t>
             </a:r>
             <a:endParaRPr lang="en-US" dirty="0"/>
@@ -6175,9 +6323,63 @@
           <a:lstStyle/>
           <a:p>
             <a:r>
-              <a:rPr lang="en-US" dirty="0"/>
-              <a:t>Top three things you learned or three skills you developed through this course</a:t>
-            </a:r>
+              <a:rPr lang="en-US" dirty="0" smtClean="0"/>
+              <a:t>1</a:t>
+            </a:r>
+          </a:p>
+          <a:p>
+            <a:r>
+              <a:rPr lang="en-US" dirty="0" smtClean="0"/>
+              <a:t>2</a:t>
+            </a:r>
+          </a:p>
+          <a:p>
+            <a:r>
+              <a:rPr lang="en-US" dirty="0" smtClean="0"/>
+              <a:t>3</a:t>
+            </a:r>
+          </a:p>
+          <a:p>
+            <a:pPr marL="0" indent="0">
+              <a:buNone/>
+            </a:pPr>
+            <a:r>
+              <a:rPr lang="en-US" dirty="0" smtClean="0"/>
+              <a:t>- Caitlin Kuleck</a:t>
+            </a:r>
+            <a:endParaRPr lang="en-US" dirty="0"/>
+          </a:p>
+          <a:p>
+            <a:r>
+              <a:rPr lang="en-US" dirty="0" smtClean="0"/>
+              <a:t>1</a:t>
+            </a:r>
+          </a:p>
+          <a:p>
+            <a:r>
+              <a:rPr lang="en-US" dirty="0" smtClean="0"/>
+              <a:t>2</a:t>
+            </a:r>
+          </a:p>
+          <a:p>
+            <a:r>
+              <a:rPr lang="en-US" dirty="0" smtClean="0"/>
+              <a:t>3</a:t>
+            </a:r>
+          </a:p>
+          <a:p>
+            <a:pPr marL="0" indent="0">
+              <a:buNone/>
+            </a:pPr>
+            <a:r>
+              <a:rPr lang="en-US" dirty="0" smtClean="0"/>
+              <a:t>- Luciano </a:t>
+            </a:r>
+            <a:r>
+              <a:rPr lang="en-US" dirty="0" err="1" smtClean="0"/>
+              <a:t>Avendano</a:t>
+            </a:r>
+            <a:endParaRPr lang="en-US" dirty="0" smtClean="0"/>
           </a:p>
         </p:txBody>
       </p:sp>

</xml_diff>

<commit_message>
added picture and top three
</commit_message>
<xml_diff>
--- a/CST205 - Final Project Powerpoint.pptx
+++ b/CST205 - Final Project Powerpoint.pptx
@@ -6,12 +6,15 @@
   </p:sldMasterIdLst>
   <p:sldIdLst>
     <p:sldId id="256" r:id="rId2"/>
-    <p:sldId id="257" r:id="rId3"/>
-    <p:sldId id="258" r:id="rId4"/>
-    <p:sldId id="262" r:id="rId5"/>
-    <p:sldId id="259" r:id="rId6"/>
-    <p:sldId id="260" r:id="rId7"/>
-    <p:sldId id="261" r:id="rId8"/>
+    <p:sldId id="264" r:id="rId3"/>
+    <p:sldId id="257" r:id="rId4"/>
+    <p:sldId id="258" r:id="rId5"/>
+    <p:sldId id="262" r:id="rId6"/>
+    <p:sldId id="263" r:id="rId7"/>
+    <p:sldId id="259" r:id="rId8"/>
+    <p:sldId id="260" r:id="rId9"/>
+    <p:sldId id="261" r:id="rId10"/>
+    <p:sldId id="265" r:id="rId11"/>
   </p:sldIdLst>
   <p:sldSz cx="12192000" cy="6858000"/>
   <p:notesSz cx="6858000" cy="9144000"/>
@@ -5792,27 +5795,19 @@
         </p:spPr>
         <p:txBody>
           <a:bodyPr>
-            <a:normAutofit fontScale="70000" lnSpcReduction="20000"/>
+            <a:normAutofit/>
           </a:bodyPr>
           <a:lstStyle/>
           <a:p>
             <a:r>
               <a:rPr lang="en-US" dirty="0" smtClean="0"/>
-              <a:t>CST205 – Final Project</a:t>
-            </a:r>
-          </a:p>
-          <a:p>
+              <a:t>CST205 – Final </a:t>
+            </a:r>
             <a:r>
               <a:rPr lang="en-US" dirty="0" smtClean="0"/>
-              <a:t>Caitlin Kuleck</a:t>
-            </a:r>
-          </a:p>
-          <a:p>
-            <a:r>
-              <a:rPr lang="en-US" dirty="0" smtClean="0"/>
-              <a:t>Luciano Avendano</a:t>
-            </a:r>
-            <a:endParaRPr lang="en-US" dirty="0"/>
+              <a:t>Project</a:t>
+            </a:r>
+            <a:endParaRPr lang="en-US" dirty="0" smtClean="0"/>
           </a:p>
         </p:txBody>
       </p:sp>
@@ -5820,6 +5815,88 @@
     <p:extLst>
       <p:ext uri="{BB962C8B-B14F-4D97-AF65-F5344CB8AC3E}">
         <p14:creationId xmlns:p14="http://schemas.microsoft.com/office/powerpoint/2010/main" val="2286821212"/>
+      </p:ext>
+    </p:extLst>
+  </p:cSld>
+  <p:clrMapOvr>
+    <a:masterClrMapping/>
+  </p:clrMapOvr>
+</p:sld>
+</file>
+
+<file path=ppt/slides/slide10.xml><?xml version="1.0" encoding="utf-8"?>
+<p:sld xmlns:a="http://schemas.openxmlformats.org/drawingml/2006/main" xmlns:r="http://schemas.openxmlformats.org/officeDocument/2006/relationships" xmlns:p="http://schemas.openxmlformats.org/presentationml/2006/main">
+  <p:cSld>
+    <p:spTree>
+      <p:nvGrpSpPr>
+        <p:cNvPr id="1" name=""/>
+        <p:cNvGrpSpPr/>
+        <p:nvPr/>
+      </p:nvGrpSpPr>
+      <p:grpSpPr>
+        <a:xfrm>
+          <a:off x="0" y="0"/>
+          <a:ext cx="0" cy="0"/>
+          <a:chOff x="0" y="0"/>
+          <a:chExt cx="0" cy="0"/>
+        </a:xfrm>
+      </p:grpSpPr>
+      <p:sp>
+        <p:nvSpPr>
+          <p:cNvPr id="2" name="Title 1"/>
+          <p:cNvSpPr>
+            <a:spLocks noGrp="1"/>
+          </p:cNvSpPr>
+          <p:nvPr>
+            <p:ph type="title"/>
+          </p:nvPr>
+        </p:nvSpPr>
+        <p:spPr/>
+        <p:txBody>
+          <a:bodyPr/>
+          <a:lstStyle/>
+          <a:p>
+            <a:r>
+              <a:rPr lang="en-US" dirty="0" smtClean="0"/>
+              <a:t>Links</a:t>
+            </a:r>
+            <a:endParaRPr lang="en-US" dirty="0"/>
+          </a:p>
+        </p:txBody>
+      </p:sp>
+      <p:sp>
+        <p:nvSpPr>
+          <p:cNvPr id="3" name="Content Placeholder 2"/>
+          <p:cNvSpPr>
+            <a:spLocks noGrp="1"/>
+          </p:cNvSpPr>
+          <p:nvPr>
+            <p:ph idx="1"/>
+          </p:nvPr>
+        </p:nvSpPr>
+        <p:spPr/>
+        <p:txBody>
+          <a:bodyPr/>
+          <a:lstStyle/>
+          <a:p>
+            <a:r>
+              <a:rPr lang="en-US" dirty="0" smtClean="0"/>
+              <a:t>Group Status Document</a:t>
+            </a:r>
+          </a:p>
+          <a:p>
+            <a:r>
+              <a:rPr lang="en-US" dirty="0" smtClean="0"/>
+              <a:t>GitHub Repository</a:t>
+            </a:r>
+            <a:endParaRPr lang="en-US" dirty="0"/>
+          </a:p>
+        </p:txBody>
+      </p:sp>
+    </p:spTree>
+    <p:extLst>
+      <p:ext uri="{BB962C8B-B14F-4D97-AF65-F5344CB8AC3E}">
+        <p14:creationId xmlns:p14="http://schemas.microsoft.com/office/powerpoint/2010/main" val="1998008064"/>
       </p:ext>
     </p:extLst>
   </p:cSld>
@@ -5848,7 +5925,7 @@
       </p:grpSpPr>
       <p:sp>
         <p:nvSpPr>
-          <p:cNvPr id="2" name="Title 1"/>
+          <p:cNvPr id="4" name="Title 3"/>
           <p:cNvSpPr>
             <a:spLocks noGrp="1"/>
           </p:cNvSpPr>
@@ -5863,7 +5940,7 @@
           <a:p>
             <a:r>
               <a:rPr lang="en-US" dirty="0" smtClean="0"/>
-              <a:t>Objective</a:t>
+              <a:t>Team Members</a:t>
             </a:r>
             <a:endParaRPr lang="en-US" dirty="0"/>
           </a:p>
@@ -5871,12 +5948,12 @@
       </p:sp>
       <p:sp>
         <p:nvSpPr>
-          <p:cNvPr id="3" name="Content Placeholder 2"/>
-          <p:cNvSpPr>
-            <a:spLocks noGrp="1"/>
-          </p:cNvSpPr>
-          <p:nvPr>
-            <p:ph idx="1"/>
+          <p:cNvPr id="5" name="Text Placeholder 4"/>
+          <p:cNvSpPr>
+            <a:spLocks noGrp="1"/>
+          </p:cNvSpPr>
+          <p:nvPr>
+            <p:ph type="body" idx="1"/>
           </p:nvPr>
         </p:nvSpPr>
         <p:spPr/>
@@ -5885,45 +5962,88 @@
           <a:lstStyle/>
           <a:p>
             <a:r>
-              <a:rPr lang="en-US" dirty="0"/>
-              <a:t>Objective - what are you planning to accomplish for the final project</a:t>
-            </a:r>
-            <a:r>
               <a:rPr lang="en-US" dirty="0" smtClean="0"/>
-              <a:t>?</a:t>
-            </a:r>
-          </a:p>
+              <a:t>Caitlin Kuleck</a:t>
+            </a:r>
+            <a:endParaRPr lang="en-US" dirty="0"/>
+          </a:p>
+        </p:txBody>
+      </p:sp>
+      <p:pic>
+        <p:nvPicPr>
+          <p:cNvPr id="9" name="Content Placeholder 8"/>
+          <p:cNvPicPr>
+            <a:picLocks noGrp="1" noChangeAspect="1"/>
+          </p:cNvPicPr>
+          <p:nvPr>
+            <p:ph sz="half" idx="2"/>
+          </p:nvPr>
+        </p:nvPicPr>
+        <p:blipFill>
+          <a:blip r:embed="rId2">
+            <a:extLst>
+              <a:ext uri="{28A0092B-C50C-407E-A947-70E740481C1C}">
+                <a14:useLocalDpi xmlns:a14="http://schemas.microsoft.com/office/drawing/2010/main" val="0"/>
+              </a:ext>
+            </a:extLst>
+          </a:blip>
+          <a:stretch>
+            <a:fillRect/>
+          </a:stretch>
+        </p:blipFill>
+        <p:spPr>
+          <a:xfrm>
+            <a:off x="1850187" y="3132138"/>
+            <a:ext cx="2983000" cy="3086100"/>
+          </a:xfrm>
+        </p:spPr>
+      </p:pic>
+      <p:sp>
+        <p:nvSpPr>
+          <p:cNvPr id="7" name="Text Placeholder 6"/>
+          <p:cNvSpPr>
+            <a:spLocks noGrp="1"/>
+          </p:cNvSpPr>
+          <p:nvPr>
+            <p:ph type="body" sz="quarter" idx="3"/>
+          </p:nvPr>
+        </p:nvSpPr>
+        <p:spPr/>
+        <p:txBody>
+          <a:bodyPr/>
+          <a:lstStyle/>
           <a:p>
             <a:r>
               <a:rPr lang="en-US" dirty="0" smtClean="0"/>
-              <a:t>With this project, the intent is to create a text-based game in which Malice is dropped into Py-Land.</a:t>
-            </a:r>
-          </a:p>
-          <a:p>
-            <a:r>
-              <a:rPr lang="en-US" dirty="0" smtClean="0"/>
-              <a:t>In each area of the map, she must make a choice, and that choice determines what happens to the map.</a:t>
-            </a:r>
-          </a:p>
-          <a:p>
-            <a:r>
-              <a:rPr lang="en-US" dirty="0" smtClean="0"/>
-              <a:t>This will be put into effect by use of picture functions, distorting what the area would have been.</a:t>
-            </a:r>
-          </a:p>
-          <a:p>
-            <a:r>
-              <a:rPr lang="en-US" dirty="0" smtClean="0"/>
-              <a:t>An image will be attached to each ‘room’, and it will display to the screen what her choice has done.</a:t>
+              <a:t>Luciano Avendano</a:t>
             </a:r>
             <a:endParaRPr lang="en-US" dirty="0"/>
+          </a:p>
+        </p:txBody>
+      </p:sp>
+      <p:sp>
+        <p:nvSpPr>
+          <p:cNvPr id="8" name="Content Placeholder 7"/>
+          <p:cNvSpPr>
+            <a:spLocks noGrp="1"/>
+          </p:cNvSpPr>
+          <p:nvPr>
+            <p:ph sz="quarter" idx="4"/>
+          </p:nvPr>
+        </p:nvSpPr>
+        <p:spPr/>
+        <p:txBody>
+          <a:bodyPr/>
+          <a:lstStyle/>
+          <a:p>
+            <a:endParaRPr lang="en-US"/>
           </a:p>
         </p:txBody>
       </p:sp>
     </p:spTree>
     <p:extLst>
       <p:ext uri="{BB962C8B-B14F-4D97-AF65-F5344CB8AC3E}">
-        <p14:creationId xmlns:p14="http://schemas.microsoft.com/office/powerpoint/2010/main" val="3087987006"/>
+        <p14:creationId xmlns:p14="http://schemas.microsoft.com/office/powerpoint/2010/main" val="516805186"/>
       </p:ext>
     </p:extLst>
   </p:cSld>
@@ -5967,7 +6087,7 @@
           <a:p>
             <a:r>
               <a:rPr lang="en-US" dirty="0" smtClean="0"/>
-              <a:t>Approach</a:t>
+              <a:t>Objective</a:t>
             </a:r>
             <a:endParaRPr lang="en-US" dirty="0"/>
           </a:p>
@@ -5989,30 +6109,36 @@
           <a:lstStyle/>
           <a:p>
             <a:r>
+              <a:rPr lang="en-US" dirty="0"/>
+              <a:t>Objective - what are you planning to accomplish for the final project</a:t>
+            </a:r>
+            <a:r>
               <a:rPr lang="en-US" dirty="0" smtClean="0"/>
-              <a:t>We started our project by drawing a map.</a:t>
+              <a:t>?</a:t>
             </a:r>
           </a:p>
           <a:p>
             <a:r>
               <a:rPr lang="en-US" dirty="0" smtClean="0"/>
-              <a:t>The map was then color-coded and </a:t>
-            </a:r>
+              <a:t>With this project, the intent is to create a text-based game in which Malice is dropped into Py-Land.</a:t>
+            </a:r>
+          </a:p>
+          <a:p>
             <a:r>
               <a:rPr lang="en-US" dirty="0" smtClean="0"/>
-              <a:t>it was decided what would happen in each area.</a:t>
+              <a:t>In each area of the map, she must make a choice, and that choice determines what happens to the map.</a:t>
             </a:r>
           </a:p>
           <a:p>
             <a:r>
               <a:rPr lang="en-US" dirty="0" smtClean="0"/>
-              <a:t>Luciano drew up the map, while Caitlin added in the additional information.</a:t>
+              <a:t>This will be put into effect by use of picture functions, distorting what the area would have been.</a:t>
             </a:r>
           </a:p>
           <a:p>
             <a:r>
               <a:rPr lang="en-US" dirty="0" smtClean="0"/>
-              <a:t>Coding was done both individually and together, with image effect functions being put together mostly by one person and text game statements put together by the other.</a:t>
+              <a:t>An image will be attached to each ‘room’, and it will display to the screen what her choice has done.</a:t>
             </a:r>
             <a:endParaRPr lang="en-US" dirty="0"/>
           </a:p>
@@ -6021,7 +6147,7 @@
     </p:spTree>
     <p:extLst>
       <p:ext uri="{BB962C8B-B14F-4D97-AF65-F5344CB8AC3E}">
-        <p14:creationId xmlns:p14="http://schemas.microsoft.com/office/powerpoint/2010/main" val="1236842447"/>
+        <p14:creationId xmlns:p14="http://schemas.microsoft.com/office/powerpoint/2010/main" val="3087987006"/>
       </p:ext>
     </p:extLst>
   </p:cSld>
@@ -6065,49 +6191,57 @@
           <a:p>
             <a:r>
               <a:rPr lang="en-US" dirty="0" smtClean="0"/>
-              <a:t>Initial </a:t>
-            </a:r>
-            <a:r>
-              <a:rPr lang="en-US" dirty="0" err="1" smtClean="0"/>
-              <a:t>MapPing</a:t>
+              <a:t>Approach</a:t>
             </a:r>
             <a:endParaRPr lang="en-US" dirty="0"/>
           </a:p>
         </p:txBody>
       </p:sp>
-      <p:pic>
-        <p:nvPicPr>
-          <p:cNvPr id="4" name="Content Placeholder 3"/>
-          <p:cNvPicPr>
-            <a:picLocks noGrp="1" noChangeAspect="1"/>
-          </p:cNvPicPr>
+      <p:sp>
+        <p:nvSpPr>
+          <p:cNvPr id="3" name="Content Placeholder 2"/>
+          <p:cNvSpPr>
+            <a:spLocks noGrp="1"/>
+          </p:cNvSpPr>
           <p:nvPr>
             <p:ph idx="1"/>
           </p:nvPr>
-        </p:nvPicPr>
-        <p:blipFill>
-          <a:blip r:embed="rId2" cstate="print">
-            <a:extLst>
-              <a:ext uri="{28A0092B-C50C-407E-A947-70E740481C1C}">
-                <a14:useLocalDpi xmlns:a14="http://schemas.microsoft.com/office/drawing/2010/main" val="0"/>
-              </a:ext>
-            </a:extLst>
-          </a:blip>
-          <a:stretch>
-            <a:fillRect/>
-          </a:stretch>
-        </p:blipFill>
-        <p:spPr>
-          <a:xfrm>
-            <a:off x="2758230" y="2193925"/>
-            <a:ext cx="6675539" cy="4024313"/>
-          </a:xfrm>
-        </p:spPr>
-      </p:pic>
+        </p:nvSpPr>
+        <p:spPr/>
+        <p:txBody>
+          <a:bodyPr/>
+          <a:lstStyle/>
+          <a:p>
+            <a:r>
+              <a:rPr lang="en-US" dirty="0" smtClean="0"/>
+              <a:t>We started our project by drawing a map.</a:t>
+            </a:r>
+          </a:p>
+          <a:p>
+            <a:r>
+              <a:rPr lang="en-US" dirty="0" smtClean="0"/>
+              <a:t>The map was then color-coded and it was decided what would happen in each area.</a:t>
+            </a:r>
+          </a:p>
+          <a:p>
+            <a:r>
+              <a:rPr lang="en-US" dirty="0" smtClean="0"/>
+              <a:t>Luciano drew up the map, while Caitlin added in the additional information.</a:t>
+            </a:r>
+          </a:p>
+          <a:p>
+            <a:r>
+              <a:rPr lang="en-US" dirty="0" smtClean="0"/>
+              <a:t>Coding was done both individually and together, with image effect functions being put together mostly by one person and text game statements put together by the other.</a:t>
+            </a:r>
+            <a:endParaRPr lang="en-US" dirty="0"/>
+          </a:p>
+        </p:txBody>
+      </p:sp>
     </p:spTree>
     <p:extLst>
       <p:ext uri="{BB962C8B-B14F-4D97-AF65-F5344CB8AC3E}">
-        <p14:creationId xmlns:p14="http://schemas.microsoft.com/office/powerpoint/2010/main" val="1539846533"/>
+        <p14:creationId xmlns:p14="http://schemas.microsoft.com/office/powerpoint/2010/main" val="1236842447"/>
       </p:ext>
     </p:extLst>
   </p:cSld>
@@ -6151,38 +6285,49 @@
           <a:p>
             <a:r>
               <a:rPr lang="en-US" dirty="0" smtClean="0"/>
-              <a:t>Results</a:t>
+              <a:t>Initial </a:t>
+            </a:r>
+            <a:r>
+              <a:rPr lang="en-US" dirty="0" err="1" smtClean="0"/>
+              <a:t>MapPing</a:t>
             </a:r>
             <a:endParaRPr lang="en-US" dirty="0"/>
           </a:p>
         </p:txBody>
       </p:sp>
-      <p:sp>
-        <p:nvSpPr>
-          <p:cNvPr id="3" name="Content Placeholder 2"/>
-          <p:cNvSpPr>
-            <a:spLocks noGrp="1"/>
-          </p:cNvSpPr>
+      <p:pic>
+        <p:nvPicPr>
+          <p:cNvPr id="4" name="Content Placeholder 3"/>
+          <p:cNvPicPr>
+            <a:picLocks noGrp="1" noChangeAspect="1"/>
+          </p:cNvPicPr>
           <p:nvPr>
             <p:ph idx="1"/>
           </p:nvPr>
-        </p:nvSpPr>
-        <p:spPr/>
-        <p:txBody>
-          <a:bodyPr/>
-          <a:lstStyle/>
-          <a:p>
-            <a:r>
-              <a:rPr lang="en-US" dirty="0"/>
-              <a:t>Results - what have you achieved so far? explain this for each individual team member.</a:t>
-            </a:r>
-          </a:p>
-        </p:txBody>
-      </p:sp>
+        </p:nvPicPr>
+        <p:blipFill>
+          <a:blip r:embed="rId2" cstate="print">
+            <a:extLst>
+              <a:ext uri="{28A0092B-C50C-407E-A947-70E740481C1C}">
+                <a14:useLocalDpi xmlns:a14="http://schemas.microsoft.com/office/drawing/2010/main" val="0"/>
+              </a:ext>
+            </a:extLst>
+          </a:blip>
+          <a:stretch>
+            <a:fillRect/>
+          </a:stretch>
+        </p:blipFill>
+        <p:spPr>
+          <a:xfrm>
+            <a:off x="2758230" y="2193925"/>
+            <a:ext cx="6675539" cy="4024313"/>
+          </a:xfrm>
+        </p:spPr>
+      </p:pic>
     </p:spTree>
     <p:extLst>
       <p:ext uri="{BB962C8B-B14F-4D97-AF65-F5344CB8AC3E}">
-        <p14:creationId xmlns:p14="http://schemas.microsoft.com/office/powerpoint/2010/main" val="370495716"/>
+        <p14:creationId xmlns:p14="http://schemas.microsoft.com/office/powerpoint/2010/main" val="1539846533"/>
       </p:ext>
     </p:extLst>
   </p:cSld>
@@ -6226,38 +6371,45 @@
           <a:p>
             <a:r>
               <a:rPr lang="en-US" dirty="0" smtClean="0"/>
-              <a:t>Demonstration</a:t>
+              <a:t>In Progress Mapping</a:t>
             </a:r>
             <a:endParaRPr lang="en-US" dirty="0"/>
           </a:p>
         </p:txBody>
       </p:sp>
-      <p:sp>
-        <p:nvSpPr>
-          <p:cNvPr id="3" name="Content Placeholder 2"/>
-          <p:cNvSpPr>
-            <a:spLocks noGrp="1"/>
-          </p:cNvSpPr>
+      <p:pic>
+        <p:nvPicPr>
+          <p:cNvPr id="4" name="Content Placeholder 3"/>
+          <p:cNvPicPr>
+            <a:picLocks noGrp="1" noChangeAspect="1"/>
+          </p:cNvPicPr>
           <p:nvPr>
             <p:ph idx="1"/>
           </p:nvPr>
-        </p:nvSpPr>
-        <p:spPr/>
-        <p:txBody>
-          <a:bodyPr/>
-          <a:lstStyle/>
-          <a:p>
-            <a:r>
-              <a:rPr lang="en-US" dirty="0"/>
-              <a:t>Demo - can you demonstrate anything? add screenshots of your application running with descriptions</a:t>
-            </a:r>
-          </a:p>
-        </p:txBody>
-      </p:sp>
+        </p:nvPicPr>
+        <p:blipFill>
+          <a:blip r:embed="rId2" cstate="print">
+            <a:extLst>
+              <a:ext uri="{28A0092B-C50C-407E-A947-70E740481C1C}">
+                <a14:useLocalDpi xmlns:a14="http://schemas.microsoft.com/office/drawing/2010/main" val="0"/>
+              </a:ext>
+            </a:extLst>
+          </a:blip>
+          <a:stretch>
+            <a:fillRect/>
+          </a:stretch>
+        </p:blipFill>
+        <p:spPr>
+          <a:xfrm>
+            <a:off x="3447647" y="2193925"/>
+            <a:ext cx="5296706" cy="4024313"/>
+          </a:xfrm>
+        </p:spPr>
+      </p:pic>
     </p:spTree>
     <p:extLst>
       <p:ext uri="{BB962C8B-B14F-4D97-AF65-F5344CB8AC3E}">
-        <p14:creationId xmlns:p14="http://schemas.microsoft.com/office/powerpoint/2010/main" val="4118866213"/>
+        <p14:creationId xmlns:p14="http://schemas.microsoft.com/office/powerpoint/2010/main" val="1499258909"/>
       </p:ext>
     </p:extLst>
   </p:cSld>
@@ -6301,6 +6453,156 @@
           <a:p>
             <a:r>
               <a:rPr lang="en-US" dirty="0" smtClean="0"/>
+              <a:t>Results</a:t>
+            </a:r>
+            <a:endParaRPr lang="en-US" dirty="0"/>
+          </a:p>
+        </p:txBody>
+      </p:sp>
+      <p:sp>
+        <p:nvSpPr>
+          <p:cNvPr id="3" name="Content Placeholder 2"/>
+          <p:cNvSpPr>
+            <a:spLocks noGrp="1"/>
+          </p:cNvSpPr>
+          <p:nvPr>
+            <p:ph idx="1"/>
+          </p:nvPr>
+        </p:nvSpPr>
+        <p:spPr/>
+        <p:txBody>
+          <a:bodyPr/>
+          <a:lstStyle/>
+          <a:p>
+            <a:r>
+              <a:rPr lang="en-US" dirty="0"/>
+              <a:t>Results - what have you achieved so far? explain this for each individual team member.</a:t>
+            </a:r>
+          </a:p>
+        </p:txBody>
+      </p:sp>
+    </p:spTree>
+    <p:extLst>
+      <p:ext uri="{BB962C8B-B14F-4D97-AF65-F5344CB8AC3E}">
+        <p14:creationId xmlns:p14="http://schemas.microsoft.com/office/powerpoint/2010/main" val="370495716"/>
+      </p:ext>
+    </p:extLst>
+  </p:cSld>
+  <p:clrMapOvr>
+    <a:masterClrMapping/>
+  </p:clrMapOvr>
+</p:sld>
+</file>
+
+<file path=ppt/slides/slide8.xml><?xml version="1.0" encoding="utf-8"?>
+<p:sld xmlns:a="http://schemas.openxmlformats.org/drawingml/2006/main" xmlns:r="http://schemas.openxmlformats.org/officeDocument/2006/relationships" xmlns:p="http://schemas.openxmlformats.org/presentationml/2006/main">
+  <p:cSld>
+    <p:spTree>
+      <p:nvGrpSpPr>
+        <p:cNvPr id="1" name=""/>
+        <p:cNvGrpSpPr/>
+        <p:nvPr/>
+      </p:nvGrpSpPr>
+      <p:grpSpPr>
+        <a:xfrm>
+          <a:off x="0" y="0"/>
+          <a:ext cx="0" cy="0"/>
+          <a:chOff x="0" y="0"/>
+          <a:chExt cx="0" cy="0"/>
+        </a:xfrm>
+      </p:grpSpPr>
+      <p:sp>
+        <p:nvSpPr>
+          <p:cNvPr id="2" name="Title 1"/>
+          <p:cNvSpPr>
+            <a:spLocks noGrp="1"/>
+          </p:cNvSpPr>
+          <p:nvPr>
+            <p:ph type="title"/>
+          </p:nvPr>
+        </p:nvSpPr>
+        <p:spPr/>
+        <p:txBody>
+          <a:bodyPr/>
+          <a:lstStyle/>
+          <a:p>
+            <a:r>
+              <a:rPr lang="en-US" dirty="0" smtClean="0"/>
+              <a:t>Demonstration</a:t>
+            </a:r>
+            <a:endParaRPr lang="en-US" dirty="0"/>
+          </a:p>
+        </p:txBody>
+      </p:sp>
+      <p:sp>
+        <p:nvSpPr>
+          <p:cNvPr id="3" name="Content Placeholder 2"/>
+          <p:cNvSpPr>
+            <a:spLocks noGrp="1"/>
+          </p:cNvSpPr>
+          <p:nvPr>
+            <p:ph idx="1"/>
+          </p:nvPr>
+        </p:nvSpPr>
+        <p:spPr/>
+        <p:txBody>
+          <a:bodyPr/>
+          <a:lstStyle/>
+          <a:p>
+            <a:r>
+              <a:rPr lang="en-US" dirty="0"/>
+              <a:t>Demo - can you demonstrate anything? add screenshots of your application running with descriptions</a:t>
+            </a:r>
+          </a:p>
+        </p:txBody>
+      </p:sp>
+    </p:spTree>
+    <p:extLst>
+      <p:ext uri="{BB962C8B-B14F-4D97-AF65-F5344CB8AC3E}">
+        <p14:creationId xmlns:p14="http://schemas.microsoft.com/office/powerpoint/2010/main" val="4118866213"/>
+      </p:ext>
+    </p:extLst>
+  </p:cSld>
+  <p:clrMapOvr>
+    <a:masterClrMapping/>
+  </p:clrMapOvr>
+</p:sld>
+</file>
+
+<file path=ppt/slides/slide9.xml><?xml version="1.0" encoding="utf-8"?>
+<p:sld xmlns:a="http://schemas.openxmlformats.org/drawingml/2006/main" xmlns:r="http://schemas.openxmlformats.org/officeDocument/2006/relationships" xmlns:p="http://schemas.openxmlformats.org/presentationml/2006/main">
+  <p:cSld>
+    <p:spTree>
+      <p:nvGrpSpPr>
+        <p:cNvPr id="1" name=""/>
+        <p:cNvGrpSpPr/>
+        <p:nvPr/>
+      </p:nvGrpSpPr>
+      <p:grpSpPr>
+        <a:xfrm>
+          <a:off x="0" y="0"/>
+          <a:ext cx="0" cy="0"/>
+          <a:chOff x="0" y="0"/>
+          <a:chExt cx="0" cy="0"/>
+        </a:xfrm>
+      </p:grpSpPr>
+      <p:sp>
+        <p:nvSpPr>
+          <p:cNvPr id="2" name="Title 1"/>
+          <p:cNvSpPr>
+            <a:spLocks noGrp="1"/>
+          </p:cNvSpPr>
+          <p:nvPr>
+            <p:ph type="title"/>
+          </p:nvPr>
+        </p:nvSpPr>
+        <p:spPr/>
+        <p:txBody>
+          <a:bodyPr/>
+          <a:lstStyle/>
+          <a:p>
+            <a:r>
+              <a:rPr lang="en-US" dirty="0" smtClean="0"/>
               <a:t>Top Three</a:t>
             </a:r>
             <a:endParaRPr lang="en-US" dirty="0"/>
@@ -6321,6 +6623,45 @@
         <p:txBody>
           <a:bodyPr/>
           <a:lstStyle/>
+          <a:p>
+            <a:r>
+              <a:rPr lang="en-US" dirty="0" smtClean="0"/>
+              <a:t>I was extremely excited to learn how to use </a:t>
+            </a:r>
+            <a:r>
+              <a:rPr lang="en-US" dirty="0" err="1" smtClean="0"/>
+              <a:t>Git</a:t>
+            </a:r>
+            <a:r>
+              <a:rPr lang="en-US" dirty="0" smtClean="0"/>
+              <a:t>. It’s change how I do things.</a:t>
+            </a:r>
+            <a:endParaRPr lang="en-US" dirty="0" smtClean="0"/>
+          </a:p>
+          <a:p>
+            <a:r>
+              <a:rPr lang="en-US" dirty="0" smtClean="0"/>
+              <a:t>Pair programming has been a great experience, although I actually thought it was going to be terrible.</a:t>
+            </a:r>
+            <a:endParaRPr lang="en-US" dirty="0" smtClean="0"/>
+          </a:p>
+          <a:p>
+            <a:r>
+              <a:rPr lang="en-US" dirty="0" smtClean="0"/>
+              <a:t>Being able to manipulate pictures or sound without the use of Photoshop is an interesting skill I never thought I would have.</a:t>
+            </a:r>
+            <a:endParaRPr lang="en-US" dirty="0" smtClean="0"/>
+          </a:p>
+          <a:p>
+            <a:pPr marL="0" indent="0">
+              <a:buNone/>
+            </a:pPr>
+            <a:r>
+              <a:rPr lang="en-US" dirty="0" smtClean="0"/>
+              <a:t>- Caitlin Kuleck</a:t>
+            </a:r>
+            <a:endParaRPr lang="en-US" dirty="0"/>
+          </a:p>
           <a:p>
             <a:r>
               <a:rPr lang="en-US" dirty="0" smtClean="0"/>
@@ -6345,41 +6686,8 @@
             </a:pPr>
             <a:r>
               <a:rPr lang="en-US" dirty="0" smtClean="0"/>
-              <a:t>- Caitlin Kuleck</a:t>
-            </a:r>
-            <a:endParaRPr lang="en-US" dirty="0"/>
-          </a:p>
-          <a:p>
-            <a:r>
-              <a:rPr lang="en-US" dirty="0" smtClean="0"/>
-              <a:t>1</a:t>
-            </a:r>
-          </a:p>
-          <a:p>
-            <a:r>
-              <a:rPr lang="en-US" dirty="0" smtClean="0"/>
-              <a:t>2</a:t>
-            </a:r>
-          </a:p>
-          <a:p>
-            <a:r>
-              <a:rPr lang="en-US" dirty="0" smtClean="0"/>
-              <a:t>3</a:t>
-            </a:r>
-          </a:p>
-          <a:p>
-            <a:pPr marL="0" indent="0">
-              <a:buNone/>
-            </a:pPr>
-            <a:r>
-              <a:rPr lang="en-US" dirty="0" smtClean="0"/>
-              <a:t>- Luciano </a:t>
-            </a:r>
-            <a:r>
-              <a:rPr lang="en-US" dirty="0" err="1" smtClean="0"/>
-              <a:t>Avendano</a:t>
-            </a:r>
-            <a:endParaRPr lang="en-US" dirty="0" smtClean="0"/>
+              <a:t>- Luciano Avendano</a:t>
+            </a:r>
           </a:p>
         </p:txBody>
       </p:sp>

</xml_diff>

<commit_message>
possible final map update
</commit_message>
<xml_diff>
--- a/CST205 - Final Project Powerpoint.pptx
+++ b/CST205 - Final Project Powerpoint.pptx
@@ -11,10 +11,11 @@
     <p:sldId id="258" r:id="rId5"/>
     <p:sldId id="262" r:id="rId6"/>
     <p:sldId id="263" r:id="rId7"/>
-    <p:sldId id="259" r:id="rId8"/>
-    <p:sldId id="260" r:id="rId9"/>
-    <p:sldId id="261" r:id="rId10"/>
-    <p:sldId id="265" r:id="rId11"/>
+    <p:sldId id="266" r:id="rId8"/>
+    <p:sldId id="259" r:id="rId9"/>
+    <p:sldId id="260" r:id="rId10"/>
+    <p:sldId id="261" r:id="rId11"/>
+    <p:sldId id="265" r:id="rId12"/>
   </p:sldIdLst>
   <p:sldSz cx="12192000" cy="6858000"/>
   <p:notesSz cx="6858000" cy="9144000"/>
@@ -5858,6 +5859,141 @@
           <a:p>
             <a:r>
               <a:rPr lang="en-US" dirty="0" smtClean="0"/>
+              <a:t>Top Three</a:t>
+            </a:r>
+            <a:endParaRPr lang="en-US" dirty="0"/>
+          </a:p>
+        </p:txBody>
+      </p:sp>
+      <p:sp>
+        <p:nvSpPr>
+          <p:cNvPr id="3" name="Content Placeholder 2"/>
+          <p:cNvSpPr>
+            <a:spLocks noGrp="1"/>
+          </p:cNvSpPr>
+          <p:nvPr>
+            <p:ph idx="1"/>
+          </p:nvPr>
+        </p:nvSpPr>
+        <p:spPr/>
+        <p:txBody>
+          <a:bodyPr/>
+          <a:lstStyle/>
+          <a:p>
+            <a:r>
+              <a:rPr lang="en-US" dirty="0" smtClean="0"/>
+              <a:t>I was extremely excited to learn how to use </a:t>
+            </a:r>
+            <a:r>
+              <a:rPr lang="en-US" dirty="0" err="1" smtClean="0"/>
+              <a:t>Git</a:t>
+            </a:r>
+            <a:r>
+              <a:rPr lang="en-US" dirty="0" smtClean="0"/>
+              <a:t>. It’s change how I do things.</a:t>
+            </a:r>
+            <a:endParaRPr lang="en-US" dirty="0" smtClean="0"/>
+          </a:p>
+          <a:p>
+            <a:r>
+              <a:rPr lang="en-US" dirty="0" smtClean="0"/>
+              <a:t>Pair programming has been a great experience, although I actually thought it was going to be terrible.</a:t>
+            </a:r>
+            <a:endParaRPr lang="en-US" dirty="0" smtClean="0"/>
+          </a:p>
+          <a:p>
+            <a:r>
+              <a:rPr lang="en-US" dirty="0" smtClean="0"/>
+              <a:t>Being able to manipulate pictures or sound without the use of Photoshop is an interesting skill I never thought I would have.</a:t>
+            </a:r>
+            <a:endParaRPr lang="en-US" dirty="0" smtClean="0"/>
+          </a:p>
+          <a:p>
+            <a:pPr marL="0" indent="0">
+              <a:buNone/>
+            </a:pPr>
+            <a:r>
+              <a:rPr lang="en-US" dirty="0" smtClean="0"/>
+              <a:t>- Caitlin Kuleck</a:t>
+            </a:r>
+            <a:endParaRPr lang="en-US" dirty="0"/>
+          </a:p>
+          <a:p>
+            <a:r>
+              <a:rPr lang="en-US" dirty="0" smtClean="0"/>
+              <a:t>1</a:t>
+            </a:r>
+          </a:p>
+          <a:p>
+            <a:r>
+              <a:rPr lang="en-US" dirty="0" smtClean="0"/>
+              <a:t>2</a:t>
+            </a:r>
+          </a:p>
+          <a:p>
+            <a:r>
+              <a:rPr lang="en-US" dirty="0" smtClean="0"/>
+              <a:t>3</a:t>
+            </a:r>
+          </a:p>
+          <a:p>
+            <a:pPr marL="0" indent="0">
+              <a:buNone/>
+            </a:pPr>
+            <a:r>
+              <a:rPr lang="en-US" dirty="0" smtClean="0"/>
+              <a:t>- Luciano Avendano</a:t>
+            </a:r>
+          </a:p>
+        </p:txBody>
+      </p:sp>
+    </p:spTree>
+    <p:extLst>
+      <p:ext uri="{BB962C8B-B14F-4D97-AF65-F5344CB8AC3E}">
+        <p14:creationId xmlns:p14="http://schemas.microsoft.com/office/powerpoint/2010/main" val="2389995244"/>
+      </p:ext>
+    </p:extLst>
+  </p:cSld>
+  <p:clrMapOvr>
+    <a:masterClrMapping/>
+  </p:clrMapOvr>
+</p:sld>
+</file>
+
+<file path=ppt/slides/slide11.xml><?xml version="1.0" encoding="utf-8"?>
+<p:sld xmlns:a="http://schemas.openxmlformats.org/drawingml/2006/main" xmlns:r="http://schemas.openxmlformats.org/officeDocument/2006/relationships" xmlns:p="http://schemas.openxmlformats.org/presentationml/2006/main">
+  <p:cSld>
+    <p:spTree>
+      <p:nvGrpSpPr>
+        <p:cNvPr id="1" name=""/>
+        <p:cNvGrpSpPr/>
+        <p:nvPr/>
+      </p:nvGrpSpPr>
+      <p:grpSpPr>
+        <a:xfrm>
+          <a:off x="0" y="0"/>
+          <a:ext cx="0" cy="0"/>
+          <a:chOff x="0" y="0"/>
+          <a:chExt cx="0" cy="0"/>
+        </a:xfrm>
+      </p:grpSpPr>
+      <p:sp>
+        <p:nvSpPr>
+          <p:cNvPr id="2" name="Title 1"/>
+          <p:cNvSpPr>
+            <a:spLocks noGrp="1"/>
+          </p:cNvSpPr>
+          <p:nvPr>
+            <p:ph type="title"/>
+          </p:nvPr>
+        </p:nvSpPr>
+        <p:spPr/>
+        <p:txBody>
+          <a:bodyPr/>
+          <a:lstStyle/>
+          <a:p>
+            <a:r>
+              <a:rPr lang="en-US" dirty="0" smtClean="0"/>
               <a:t>Links</a:t>
             </a:r>
             <a:endParaRPr lang="en-US" dirty="0"/>
@@ -6453,38 +6589,45 @@
           <a:p>
             <a:r>
               <a:rPr lang="en-US" dirty="0" smtClean="0"/>
-              <a:t>Results</a:t>
+              <a:t>Final Mapping</a:t>
             </a:r>
             <a:endParaRPr lang="en-US" dirty="0"/>
           </a:p>
         </p:txBody>
       </p:sp>
-      <p:sp>
-        <p:nvSpPr>
-          <p:cNvPr id="3" name="Content Placeholder 2"/>
-          <p:cNvSpPr>
-            <a:spLocks noGrp="1"/>
-          </p:cNvSpPr>
+      <p:pic>
+        <p:nvPicPr>
+          <p:cNvPr id="4" name="Content Placeholder 3"/>
+          <p:cNvPicPr>
+            <a:picLocks noGrp="1" noChangeAspect="1"/>
+          </p:cNvPicPr>
           <p:nvPr>
             <p:ph idx="1"/>
           </p:nvPr>
-        </p:nvSpPr>
-        <p:spPr/>
-        <p:txBody>
-          <a:bodyPr/>
-          <a:lstStyle/>
-          <a:p>
-            <a:r>
-              <a:rPr lang="en-US" dirty="0"/>
-              <a:t>Results - what have you achieved so far? explain this for each individual team member.</a:t>
-            </a:r>
-          </a:p>
-        </p:txBody>
-      </p:sp>
+        </p:nvPicPr>
+        <p:blipFill>
+          <a:blip r:embed="rId2" cstate="print">
+            <a:extLst>
+              <a:ext uri="{28A0092B-C50C-407E-A947-70E740481C1C}">
+                <a14:useLocalDpi xmlns:a14="http://schemas.microsoft.com/office/drawing/2010/main" val="0"/>
+              </a:ext>
+            </a:extLst>
+          </a:blip>
+          <a:stretch>
+            <a:fillRect/>
+          </a:stretch>
+        </p:blipFill>
+        <p:spPr>
+          <a:xfrm>
+            <a:off x="2758230" y="2193925"/>
+            <a:ext cx="6675539" cy="4024313"/>
+          </a:xfrm>
+        </p:spPr>
+      </p:pic>
     </p:spTree>
     <p:extLst>
       <p:ext uri="{BB962C8B-B14F-4D97-AF65-F5344CB8AC3E}">
-        <p14:creationId xmlns:p14="http://schemas.microsoft.com/office/powerpoint/2010/main" val="370495716"/>
+        <p14:creationId xmlns:p14="http://schemas.microsoft.com/office/powerpoint/2010/main" val="3326153022"/>
       </p:ext>
     </p:extLst>
   </p:cSld>
@@ -6528,7 +6671,7 @@
           <a:p>
             <a:r>
               <a:rPr lang="en-US" dirty="0" smtClean="0"/>
-              <a:t>Demonstration</a:t>
+              <a:t>Results</a:t>
             </a:r>
             <a:endParaRPr lang="en-US" dirty="0"/>
           </a:p>
@@ -6551,7 +6694,7 @@
           <a:p>
             <a:r>
               <a:rPr lang="en-US" dirty="0"/>
-              <a:t>Demo - can you demonstrate anything? add screenshots of your application running with descriptions</a:t>
+              <a:t>Results - what have you achieved so far? explain this for each individual team member.</a:t>
             </a:r>
           </a:p>
         </p:txBody>
@@ -6559,7 +6702,7 @@
     </p:spTree>
     <p:extLst>
       <p:ext uri="{BB962C8B-B14F-4D97-AF65-F5344CB8AC3E}">
-        <p14:creationId xmlns:p14="http://schemas.microsoft.com/office/powerpoint/2010/main" val="4118866213"/>
+        <p14:creationId xmlns:p14="http://schemas.microsoft.com/office/powerpoint/2010/main" val="370495716"/>
       </p:ext>
     </p:extLst>
   </p:cSld>
@@ -6603,7 +6746,7 @@
           <a:p>
             <a:r>
               <a:rPr lang="en-US" dirty="0" smtClean="0"/>
-              <a:t>Top Three</a:t>
+              <a:t>Demonstration</a:t>
             </a:r>
             <a:endParaRPr lang="en-US" dirty="0"/>
           </a:p>
@@ -6625,68 +6768,8 @@
           <a:lstStyle/>
           <a:p>
             <a:r>
-              <a:rPr lang="en-US" dirty="0" smtClean="0"/>
-              <a:t>I was extremely excited to learn how to use </a:t>
-            </a:r>
-            <a:r>
-              <a:rPr lang="en-US" dirty="0" err="1" smtClean="0"/>
-              <a:t>Git</a:t>
-            </a:r>
-            <a:r>
-              <a:rPr lang="en-US" dirty="0" smtClean="0"/>
-              <a:t>. It’s change how I do things.</a:t>
-            </a:r>
-            <a:endParaRPr lang="en-US" dirty="0" smtClean="0"/>
-          </a:p>
-          <a:p>
-            <a:r>
-              <a:rPr lang="en-US" dirty="0" smtClean="0"/>
-              <a:t>Pair programming has been a great experience, although I actually thought it was going to be terrible.</a:t>
-            </a:r>
-            <a:endParaRPr lang="en-US" dirty="0" smtClean="0"/>
-          </a:p>
-          <a:p>
-            <a:r>
-              <a:rPr lang="en-US" dirty="0" smtClean="0"/>
-              <a:t>Being able to manipulate pictures or sound without the use of Photoshop is an interesting skill I never thought I would have.</a:t>
-            </a:r>
-            <a:endParaRPr lang="en-US" dirty="0" smtClean="0"/>
-          </a:p>
-          <a:p>
-            <a:pPr marL="0" indent="0">
-              <a:buNone/>
-            </a:pPr>
-            <a:r>
-              <a:rPr lang="en-US" dirty="0" smtClean="0"/>
-              <a:t>- Caitlin Kuleck</a:t>
-            </a:r>
-            <a:endParaRPr lang="en-US" dirty="0"/>
-          </a:p>
-          <a:p>
-            <a:r>
-              <a:rPr lang="en-US" dirty="0" smtClean="0"/>
-              <a:t>1</a:t>
-            </a:r>
-          </a:p>
-          <a:p>
-            <a:r>
-              <a:rPr lang="en-US" dirty="0" smtClean="0"/>
-              <a:t>2</a:t>
-            </a:r>
-          </a:p>
-          <a:p>
-            <a:r>
-              <a:rPr lang="en-US" dirty="0" smtClean="0"/>
-              <a:t>3</a:t>
-            </a:r>
-          </a:p>
-          <a:p>
-            <a:pPr marL="0" indent="0">
-              <a:buNone/>
-            </a:pPr>
-            <a:r>
-              <a:rPr lang="en-US" dirty="0" smtClean="0"/>
-              <a:t>- Luciano Avendano</a:t>
+              <a:rPr lang="en-US" dirty="0"/>
+              <a:t>Demo - can you demonstrate anything? add screenshots of your application running with descriptions</a:t>
             </a:r>
           </a:p>
         </p:txBody>
@@ -6694,7 +6777,7 @@
     </p:spTree>
     <p:extLst>
       <p:ext uri="{BB962C8B-B14F-4D97-AF65-F5344CB8AC3E}">
-        <p14:creationId xmlns:p14="http://schemas.microsoft.com/office/powerpoint/2010/main" val="2389995244"/>
+        <p14:creationId xmlns:p14="http://schemas.microsoft.com/office/powerpoint/2010/main" val="4118866213"/>
       </p:ext>
     </p:extLst>
   </p:cSld>

</xml_diff>

<commit_message>
mostly done powerpoint. needs video link
</commit_message>
<xml_diff>
--- a/CST205 - Final Project Powerpoint.pptx
+++ b/CST205 - Final Project Powerpoint.pptx
@@ -9,13 +9,15 @@
     <p:sldId id="264" r:id="rId3"/>
     <p:sldId id="257" r:id="rId4"/>
     <p:sldId id="258" r:id="rId5"/>
-    <p:sldId id="262" r:id="rId6"/>
-    <p:sldId id="263" r:id="rId7"/>
-    <p:sldId id="266" r:id="rId8"/>
-    <p:sldId id="259" r:id="rId9"/>
-    <p:sldId id="260" r:id="rId10"/>
-    <p:sldId id="261" r:id="rId11"/>
-    <p:sldId id="265" r:id="rId12"/>
+    <p:sldId id="267" r:id="rId6"/>
+    <p:sldId id="262" r:id="rId7"/>
+    <p:sldId id="263" r:id="rId8"/>
+    <p:sldId id="266" r:id="rId9"/>
+    <p:sldId id="259" r:id="rId10"/>
+    <p:sldId id="260" r:id="rId11"/>
+    <p:sldId id="268" r:id="rId12"/>
+    <p:sldId id="261" r:id="rId13"/>
+    <p:sldId id="265" r:id="rId14"/>
   </p:sldIdLst>
   <p:sldSz cx="12192000" cy="6858000"/>
   <p:notesSz cx="6858000" cy="9144000"/>
@@ -292,7 +294,7 @@
           <a:p>
             <a:fld id="{CBEA0315-3FFD-4CEB-B15A-57C2284689D6}" type="datetimeFigureOut">
               <a:rPr lang="en-US" smtClean="0"/>
-              <a:t>12/15/2014</a:t>
+              <a:t>12/16/2014</a:t>
             </a:fld>
             <a:endParaRPr lang="en-US"/>
           </a:p>
@@ -559,7 +561,7 @@
           <a:p>
             <a:fld id="{CBEA0315-3FFD-4CEB-B15A-57C2284689D6}" type="datetimeFigureOut">
               <a:rPr lang="en-US" smtClean="0"/>
-              <a:t>12/15/2014</a:t>
+              <a:t>12/16/2014</a:t>
             </a:fld>
             <a:endParaRPr lang="en-US"/>
           </a:p>
@@ -790,7 +792,7 @@
           <a:p>
             <a:fld id="{CBEA0315-3FFD-4CEB-B15A-57C2284689D6}" type="datetimeFigureOut">
               <a:rPr lang="en-US" smtClean="0"/>
-              <a:t>12/15/2014</a:t>
+              <a:t>12/16/2014</a:t>
             </a:fld>
             <a:endParaRPr lang="en-US"/>
           </a:p>
@@ -1100,7 +1102,7 @@
           <a:p>
             <a:fld id="{CBEA0315-3FFD-4CEB-B15A-57C2284689D6}" type="datetimeFigureOut">
               <a:rPr lang="en-US" smtClean="0"/>
-              <a:t>12/15/2014</a:t>
+              <a:t>12/16/2014</a:t>
             </a:fld>
             <a:endParaRPr lang="en-US"/>
           </a:p>
@@ -1573,7 +1575,7 @@
           <a:p>
             <a:fld id="{CBEA0315-3FFD-4CEB-B15A-57C2284689D6}" type="datetimeFigureOut">
               <a:rPr lang="en-US" smtClean="0"/>
-              <a:t>12/15/2014</a:t>
+              <a:t>12/16/2014</a:t>
             </a:fld>
             <a:endParaRPr lang="en-US"/>
           </a:p>
@@ -2120,7 +2122,7 @@
           <a:p>
             <a:fld id="{CBEA0315-3FFD-4CEB-B15A-57C2284689D6}" type="datetimeFigureOut">
               <a:rPr lang="en-US" smtClean="0"/>
-              <a:t>12/15/2014</a:t>
+              <a:t>12/16/2014</a:t>
             </a:fld>
             <a:endParaRPr lang="en-US"/>
           </a:p>
@@ -2894,7 +2896,7 @@
           <a:p>
             <a:fld id="{CBEA0315-3FFD-4CEB-B15A-57C2284689D6}" type="datetimeFigureOut">
               <a:rPr lang="en-US" smtClean="0"/>
-              <a:t>12/15/2014</a:t>
+              <a:t>12/16/2014</a:t>
             </a:fld>
             <a:endParaRPr lang="en-US"/>
           </a:p>
@@ -3069,7 +3071,7 @@
           <a:p>
             <a:fld id="{CBEA0315-3FFD-4CEB-B15A-57C2284689D6}" type="datetimeFigureOut">
               <a:rPr lang="en-US" smtClean="0"/>
-              <a:t>12/15/2014</a:t>
+              <a:t>12/16/2014</a:t>
             </a:fld>
             <a:endParaRPr lang="en-US"/>
           </a:p>
@@ -3292,7 +3294,7 @@
           <a:p>
             <a:fld id="{CBEA0315-3FFD-4CEB-B15A-57C2284689D6}" type="datetimeFigureOut">
               <a:rPr lang="en-US" smtClean="0"/>
-              <a:t>12/15/2014</a:t>
+              <a:t>12/16/2014</a:t>
             </a:fld>
             <a:endParaRPr lang="en-US"/>
           </a:p>
@@ -3472,7 +3474,7 @@
           <a:p>
             <a:fld id="{CBEA0315-3FFD-4CEB-B15A-57C2284689D6}" type="datetimeFigureOut">
               <a:rPr lang="en-US" smtClean="0"/>
-              <a:t>12/15/2014</a:t>
+              <a:t>12/16/2014</a:t>
             </a:fld>
             <a:endParaRPr lang="en-US"/>
           </a:p>
@@ -3761,7 +3763,7 @@
           <a:p>
             <a:fld id="{CBEA0315-3FFD-4CEB-B15A-57C2284689D6}" type="datetimeFigureOut">
               <a:rPr lang="en-US" smtClean="0"/>
-              <a:t>12/15/2014</a:t>
+              <a:t>12/16/2014</a:t>
             </a:fld>
             <a:endParaRPr lang="en-US"/>
           </a:p>
@@ -4003,7 +4005,7 @@
           <a:p>
             <a:fld id="{CBEA0315-3FFD-4CEB-B15A-57C2284689D6}" type="datetimeFigureOut">
               <a:rPr lang="en-US" smtClean="0"/>
-              <a:t>12/15/2014</a:t>
+              <a:t>12/16/2014</a:t>
             </a:fld>
             <a:endParaRPr lang="en-US"/>
           </a:p>
@@ -4382,7 +4384,7 @@
           <a:p>
             <a:fld id="{CBEA0315-3FFD-4CEB-B15A-57C2284689D6}" type="datetimeFigureOut">
               <a:rPr lang="en-US" smtClean="0"/>
-              <a:t>12/15/2014</a:t>
+              <a:t>12/16/2014</a:t>
             </a:fld>
             <a:endParaRPr lang="en-US"/>
           </a:p>
@@ -4500,7 +4502,7 @@
           <a:p>
             <a:fld id="{CBEA0315-3FFD-4CEB-B15A-57C2284689D6}" type="datetimeFigureOut">
               <a:rPr lang="en-US" smtClean="0"/>
-              <a:t>12/15/2014</a:t>
+              <a:t>12/16/2014</a:t>
             </a:fld>
             <a:endParaRPr lang="en-US"/>
           </a:p>
@@ -4595,7 +4597,7 @@
           <a:p>
             <a:fld id="{CBEA0315-3FFD-4CEB-B15A-57C2284689D6}" type="datetimeFigureOut">
               <a:rPr lang="en-US" smtClean="0"/>
-              <a:t>12/15/2014</a:t>
+              <a:t>12/16/2014</a:t>
             </a:fld>
             <a:endParaRPr lang="en-US"/>
           </a:p>
@@ -4844,7 +4846,7 @@
           <a:p>
             <a:fld id="{CBEA0315-3FFD-4CEB-B15A-57C2284689D6}" type="datetimeFigureOut">
               <a:rPr lang="en-US" smtClean="0"/>
-              <a:t>12/15/2014</a:t>
+              <a:t>12/16/2014</a:t>
             </a:fld>
             <a:endParaRPr lang="en-US"/>
           </a:p>
@@ -5101,7 +5103,7 @@
           <a:p>
             <a:fld id="{CBEA0315-3FFD-4CEB-B15A-57C2284689D6}" type="datetimeFigureOut">
               <a:rPr lang="en-US" smtClean="0"/>
-              <a:t>12/15/2014</a:t>
+              <a:t>12/16/2014</a:t>
             </a:fld>
             <a:endParaRPr lang="en-US"/>
           </a:p>
@@ -5344,7 +5346,7 @@
           <a:p>
             <a:fld id="{CBEA0315-3FFD-4CEB-B15A-57C2284689D6}" type="datetimeFigureOut">
               <a:rPr lang="en-US" smtClean="0"/>
-              <a:t>12/15/2014</a:t>
+              <a:t>12/16/2014</a:t>
             </a:fld>
             <a:endParaRPr lang="en-US"/>
           </a:p>
@@ -5802,13 +5804,8 @@
           <a:p>
             <a:r>
               <a:rPr lang="en-US" dirty="0" smtClean="0"/>
-              <a:t>CST205 – Final </a:t>
-            </a:r>
-            <a:r>
-              <a:rPr lang="en-US" dirty="0" smtClean="0"/>
-              <a:t>Project</a:t>
-            </a:r>
-            <a:endParaRPr lang="en-US" dirty="0" smtClean="0"/>
+              <a:t>CST205 – Final Project</a:t>
+            </a:r>
           </a:p>
         </p:txBody>
       </p:sp>
@@ -5859,98 +5856,135 @@
           <a:p>
             <a:r>
               <a:rPr lang="en-US" dirty="0" smtClean="0"/>
-              <a:t>Top Three</a:t>
+              <a:t>Demonstration</a:t>
             </a:r>
             <a:endParaRPr lang="en-US" dirty="0"/>
           </a:p>
         </p:txBody>
       </p:sp>
-      <p:sp>
-        <p:nvSpPr>
-          <p:cNvPr id="3" name="Content Placeholder 2"/>
-          <p:cNvSpPr>
-            <a:spLocks noGrp="1"/>
-          </p:cNvSpPr>
+      <p:pic>
+        <p:nvPicPr>
+          <p:cNvPr id="4" name="Content Placeholder 3"/>
+          <p:cNvPicPr>
+            <a:picLocks noGrp="1" noChangeAspect="1"/>
+          </p:cNvPicPr>
           <p:nvPr>
             <p:ph idx="1"/>
           </p:nvPr>
-        </p:nvSpPr>
-        <p:spPr/>
-        <p:txBody>
-          <a:bodyPr/>
+        </p:nvPicPr>
+        <p:blipFill>
+          <a:blip r:embed="rId2">
+            <a:extLst>
+              <a:ext uri="{28A0092B-C50C-407E-A947-70E740481C1C}">
+                <a14:useLocalDpi xmlns:a14="http://schemas.microsoft.com/office/drawing/2010/main" val="0"/>
+              </a:ext>
+            </a:extLst>
+          </a:blip>
+          <a:stretch>
+            <a:fillRect/>
+          </a:stretch>
+        </p:blipFill>
+        <p:spPr>
+          <a:xfrm>
+            <a:off x="652318" y="1684259"/>
+            <a:ext cx="4707747" cy="3337446"/>
+          </a:xfrm>
+        </p:spPr>
+      </p:pic>
+      <p:pic>
+        <p:nvPicPr>
+          <p:cNvPr id="5" name="Picture 4"/>
+          <p:cNvPicPr>
+            <a:picLocks noChangeAspect="1"/>
+          </p:cNvPicPr>
+          <p:nvPr/>
+        </p:nvPicPr>
+        <p:blipFill>
+          <a:blip r:embed="rId3">
+            <a:extLst>
+              <a:ext uri="{28A0092B-C50C-407E-A947-70E740481C1C}">
+                <a14:useLocalDpi xmlns:a14="http://schemas.microsoft.com/office/drawing/2010/main" val="0"/>
+              </a:ext>
+            </a:extLst>
+          </a:blip>
+          <a:stretch>
+            <a:fillRect/>
+          </a:stretch>
+        </p:blipFill>
+        <p:spPr>
+          <a:xfrm>
+            <a:off x="6427081" y="1684259"/>
+            <a:ext cx="5079119" cy="3337446"/>
+          </a:xfrm>
+          <a:prstGeom prst="rect">
+            <a:avLst/>
+          </a:prstGeom>
+        </p:spPr>
+      </p:pic>
+      <p:sp>
+        <p:nvSpPr>
+          <p:cNvPr id="8" name="TextBox 7"/>
+          <p:cNvSpPr txBox="1"/>
+          <p:nvPr/>
+        </p:nvSpPr>
+        <p:spPr>
+          <a:xfrm>
+            <a:off x="652317" y="5021705"/>
+            <a:ext cx="4707747" cy="646331"/>
+          </a:xfrm>
+          <a:prstGeom prst="rect">
+            <a:avLst/>
+          </a:prstGeom>
+          <a:noFill/>
+        </p:spPr>
+        <p:txBody>
+          <a:bodyPr wrap="square" rtlCol="0">
+            <a:spAutoFit/>
+          </a:bodyPr>
           <a:lstStyle/>
           <a:p>
             <a:r>
               <a:rPr lang="en-US" dirty="0" smtClean="0"/>
-              <a:t>I was extremely excited to learn how to use </a:t>
-            </a:r>
-            <a:r>
-              <a:rPr lang="en-US" dirty="0" err="1" smtClean="0"/>
-              <a:t>Git</a:t>
-            </a:r>
+              <a:t>This displays the opening of our game: Which path do you choose?</a:t>
+            </a:r>
+            <a:endParaRPr lang="en-US" dirty="0"/>
+          </a:p>
+        </p:txBody>
+      </p:sp>
+      <p:sp>
+        <p:nvSpPr>
+          <p:cNvPr id="9" name="TextBox 8"/>
+          <p:cNvSpPr txBox="1"/>
+          <p:nvPr/>
+        </p:nvSpPr>
+        <p:spPr>
+          <a:xfrm>
+            <a:off x="6427081" y="5021705"/>
+            <a:ext cx="5079119" cy="646331"/>
+          </a:xfrm>
+          <a:prstGeom prst="rect">
+            <a:avLst/>
+          </a:prstGeom>
+          <a:noFill/>
+        </p:spPr>
+        <p:txBody>
+          <a:bodyPr wrap="square" rtlCol="0">
+            <a:spAutoFit/>
+          </a:bodyPr>
+          <a:lstStyle/>
+          <a:p>
             <a:r>
               <a:rPr lang="en-US" dirty="0" smtClean="0"/>
-              <a:t>. It’s change how I do things.</a:t>
-            </a:r>
-            <a:endParaRPr lang="en-US" dirty="0" smtClean="0"/>
-          </a:p>
-          <a:p>
-            <a:r>
-              <a:rPr lang="en-US" dirty="0" smtClean="0"/>
-              <a:t>Pair programming has been a great experience, although I actually thought it was going to be terrible.</a:t>
-            </a:r>
-            <a:endParaRPr lang="en-US" dirty="0" smtClean="0"/>
-          </a:p>
-          <a:p>
-            <a:r>
-              <a:rPr lang="en-US" dirty="0" smtClean="0"/>
-              <a:t>Being able to manipulate pictures or sound without the use of Photoshop is an interesting skill I never thought I would have.</a:t>
-            </a:r>
-            <a:endParaRPr lang="en-US" dirty="0" smtClean="0"/>
-          </a:p>
-          <a:p>
-            <a:pPr marL="0" indent="0">
-              <a:buNone/>
-            </a:pPr>
-            <a:r>
-              <a:rPr lang="en-US" dirty="0" smtClean="0"/>
-              <a:t>- Caitlin Kuleck</a:t>
+              <a:t>In many of the areas are trap doors. It’s hard to know where they will lead you next.</a:t>
             </a:r>
             <a:endParaRPr lang="en-US" dirty="0"/>
-          </a:p>
-          <a:p>
-            <a:r>
-              <a:rPr lang="en-US" dirty="0" smtClean="0"/>
-              <a:t>1</a:t>
-            </a:r>
-          </a:p>
-          <a:p>
-            <a:r>
-              <a:rPr lang="en-US" dirty="0" smtClean="0"/>
-              <a:t>2</a:t>
-            </a:r>
-          </a:p>
-          <a:p>
-            <a:r>
-              <a:rPr lang="en-US" dirty="0" smtClean="0"/>
-              <a:t>3</a:t>
-            </a:r>
-          </a:p>
-          <a:p>
-            <a:pPr marL="0" indent="0">
-              <a:buNone/>
-            </a:pPr>
-            <a:r>
-              <a:rPr lang="en-US" dirty="0" smtClean="0"/>
-              <a:t>- Luciano Avendano</a:t>
-            </a:r>
           </a:p>
         </p:txBody>
       </p:sp>
     </p:spTree>
     <p:extLst>
       <p:ext uri="{BB962C8B-B14F-4D97-AF65-F5344CB8AC3E}">
-        <p14:creationId xmlns:p14="http://schemas.microsoft.com/office/powerpoint/2010/main" val="2389995244"/>
+        <p14:creationId xmlns:p14="http://schemas.microsoft.com/office/powerpoint/2010/main" val="4118866213"/>
       </p:ext>
     </p:extLst>
   </p:cSld>
@@ -5994,6 +6028,365 @@
           <a:p>
             <a:r>
               <a:rPr lang="en-US" dirty="0" smtClean="0"/>
+              <a:t>Demonstration Cont.</a:t>
+            </a:r>
+            <a:endParaRPr lang="en-US" dirty="0"/>
+          </a:p>
+        </p:txBody>
+      </p:sp>
+      <p:pic>
+        <p:nvPicPr>
+          <p:cNvPr id="4" name="Content Placeholder 3"/>
+          <p:cNvPicPr>
+            <a:picLocks noGrp="1" noChangeAspect="1"/>
+          </p:cNvPicPr>
+          <p:nvPr>
+            <p:ph idx="1"/>
+          </p:nvPr>
+        </p:nvPicPr>
+        <p:blipFill>
+          <a:blip r:embed="rId2">
+            <a:extLst>
+              <a:ext uri="{28A0092B-C50C-407E-A947-70E740481C1C}">
+                <a14:useLocalDpi xmlns:a14="http://schemas.microsoft.com/office/drawing/2010/main" val="0"/>
+              </a:ext>
+            </a:extLst>
+          </a:blip>
+          <a:stretch>
+            <a:fillRect/>
+          </a:stretch>
+        </p:blipFill>
+        <p:spPr>
+          <a:xfrm>
+            <a:off x="1000490" y="1774200"/>
+            <a:ext cx="4804050" cy="3780892"/>
+          </a:xfrm>
+        </p:spPr>
+      </p:pic>
+      <p:pic>
+        <p:nvPicPr>
+          <p:cNvPr id="5" name="Picture 4"/>
+          <p:cNvPicPr>
+            <a:picLocks noChangeAspect="1"/>
+          </p:cNvPicPr>
+          <p:nvPr/>
+        </p:nvPicPr>
+        <p:blipFill>
+          <a:blip r:embed="rId3">
+            <a:extLst>
+              <a:ext uri="{28A0092B-C50C-407E-A947-70E740481C1C}">
+                <a14:useLocalDpi xmlns:a14="http://schemas.microsoft.com/office/drawing/2010/main" val="0"/>
+              </a:ext>
+            </a:extLst>
+          </a:blip>
+          <a:stretch>
+            <a:fillRect/>
+          </a:stretch>
+        </p:blipFill>
+        <p:spPr>
+          <a:xfrm>
+            <a:off x="7447501" y="1774200"/>
+            <a:ext cx="3594004" cy="3780892"/>
+          </a:xfrm>
+          <a:prstGeom prst="rect">
+            <a:avLst/>
+          </a:prstGeom>
+        </p:spPr>
+      </p:pic>
+      <p:sp>
+        <p:nvSpPr>
+          <p:cNvPr id="6" name="TextBox 5"/>
+          <p:cNvSpPr txBox="1"/>
+          <p:nvPr/>
+        </p:nvSpPr>
+        <p:spPr>
+          <a:xfrm>
+            <a:off x="996639" y="5555092"/>
+            <a:ext cx="4807901" cy="646331"/>
+          </a:xfrm>
+          <a:prstGeom prst="rect">
+            <a:avLst/>
+          </a:prstGeom>
+          <a:noFill/>
+        </p:spPr>
+        <p:txBody>
+          <a:bodyPr wrap="square" rtlCol="0">
+            <a:spAutoFit/>
+          </a:bodyPr>
+          <a:lstStyle/>
+          <a:p>
+            <a:r>
+              <a:rPr lang="en-US" dirty="0" smtClean="0"/>
+              <a:t>It’s such a pretty area. Do you really want to leave?</a:t>
+            </a:r>
+            <a:endParaRPr lang="en-US" dirty="0"/>
+          </a:p>
+        </p:txBody>
+      </p:sp>
+      <p:sp>
+        <p:nvSpPr>
+          <p:cNvPr id="7" name="TextBox 6"/>
+          <p:cNvSpPr txBox="1"/>
+          <p:nvPr/>
+        </p:nvSpPr>
+        <p:spPr>
+          <a:xfrm>
+            <a:off x="7447501" y="5555092"/>
+            <a:ext cx="3594004" cy="1200329"/>
+          </a:xfrm>
+          <a:prstGeom prst="rect">
+            <a:avLst/>
+          </a:prstGeom>
+          <a:noFill/>
+        </p:spPr>
+        <p:txBody>
+          <a:bodyPr wrap="square" rtlCol="0">
+            <a:spAutoFit/>
+          </a:bodyPr>
+          <a:lstStyle/>
+          <a:p>
+            <a:r>
+              <a:rPr lang="en-US" dirty="0" smtClean="0"/>
+              <a:t>Some areas are more confusing than others, while others are less confusing than you think.</a:t>
+            </a:r>
+            <a:endParaRPr lang="en-US" dirty="0"/>
+          </a:p>
+        </p:txBody>
+      </p:sp>
+    </p:spTree>
+    <p:extLst>
+      <p:ext uri="{BB962C8B-B14F-4D97-AF65-F5344CB8AC3E}">
+        <p14:creationId xmlns:p14="http://schemas.microsoft.com/office/powerpoint/2010/main" val="72617797"/>
+      </p:ext>
+    </p:extLst>
+  </p:cSld>
+  <p:clrMapOvr>
+    <a:masterClrMapping/>
+  </p:clrMapOvr>
+</p:sld>
+</file>
+
+<file path=ppt/slides/slide12.xml><?xml version="1.0" encoding="utf-8"?>
+<p:sld xmlns:a="http://schemas.openxmlformats.org/drawingml/2006/main" xmlns:r="http://schemas.openxmlformats.org/officeDocument/2006/relationships" xmlns:p="http://schemas.openxmlformats.org/presentationml/2006/main">
+  <p:cSld>
+    <p:spTree>
+      <p:nvGrpSpPr>
+        <p:cNvPr id="1" name=""/>
+        <p:cNvGrpSpPr/>
+        <p:nvPr/>
+      </p:nvGrpSpPr>
+      <p:grpSpPr>
+        <a:xfrm>
+          <a:off x="0" y="0"/>
+          <a:ext cx="0" cy="0"/>
+          <a:chOff x="0" y="0"/>
+          <a:chExt cx="0" cy="0"/>
+        </a:xfrm>
+      </p:grpSpPr>
+      <p:sp>
+        <p:nvSpPr>
+          <p:cNvPr id="2" name="Title 1"/>
+          <p:cNvSpPr>
+            <a:spLocks noGrp="1"/>
+          </p:cNvSpPr>
+          <p:nvPr>
+            <p:ph type="title"/>
+          </p:nvPr>
+        </p:nvSpPr>
+        <p:spPr/>
+        <p:txBody>
+          <a:bodyPr/>
+          <a:lstStyle/>
+          <a:p>
+            <a:r>
+              <a:rPr lang="en-US" dirty="0" smtClean="0"/>
+              <a:t>Top Three</a:t>
+            </a:r>
+            <a:endParaRPr lang="en-US" dirty="0"/>
+          </a:p>
+        </p:txBody>
+      </p:sp>
+      <p:sp>
+        <p:nvSpPr>
+          <p:cNvPr id="3" name="Content Placeholder 2"/>
+          <p:cNvSpPr>
+            <a:spLocks noGrp="1"/>
+          </p:cNvSpPr>
+          <p:nvPr>
+            <p:ph idx="1"/>
+          </p:nvPr>
+        </p:nvSpPr>
+        <p:spPr/>
+        <p:txBody>
+          <a:bodyPr>
+            <a:normAutofit fontScale="85000" lnSpcReduction="20000"/>
+          </a:bodyPr>
+          <a:lstStyle/>
+          <a:p>
+            <a:r>
+              <a:rPr lang="en-US" dirty="0" smtClean="0"/>
+              <a:t>I was extremely excited to learn how to use </a:t>
+            </a:r>
+            <a:r>
+              <a:rPr lang="en-US" dirty="0" err="1" smtClean="0"/>
+              <a:t>Git</a:t>
+            </a:r>
+            <a:r>
+              <a:rPr lang="en-US" dirty="0" smtClean="0"/>
+              <a:t>. It’s change how I do things.</a:t>
+            </a:r>
+          </a:p>
+          <a:p>
+            <a:r>
+              <a:rPr lang="en-US" dirty="0" smtClean="0"/>
+              <a:t>Pair programming has been a great experience, although I actually thought it was going to be terrible.</a:t>
+            </a:r>
+          </a:p>
+          <a:p>
+            <a:r>
+              <a:rPr lang="en-US" dirty="0" smtClean="0"/>
+              <a:t>Being able to manipulate pictures or sound without the use of Photoshop is an interesting skill I never thought I would have.</a:t>
+            </a:r>
+          </a:p>
+          <a:p>
+            <a:pPr marL="0" indent="0">
+              <a:buNone/>
+            </a:pPr>
+            <a:r>
+              <a:rPr lang="en-US" dirty="0" smtClean="0"/>
+              <a:t>- </a:t>
+            </a:r>
+            <a:r>
+              <a:rPr lang="en-US" sz="2400" dirty="0" smtClean="0"/>
+              <a:t>Caitlin Kuleck</a:t>
+            </a:r>
+            <a:endParaRPr lang="en-US" sz="2400" dirty="0"/>
+          </a:p>
+          <a:p>
+            <a:r>
+              <a:rPr lang="en-US" dirty="0"/>
+              <a:t>I enjoyed learning python from a completely different perspective. </a:t>
+            </a:r>
+            <a:r>
+              <a:rPr lang="en-US" dirty="0" smtClean="0"/>
+              <a:t>I listened </a:t>
+            </a:r>
+            <a:r>
+              <a:rPr lang="en-US" dirty="0"/>
+              <a:t>to all my classmates input and ideas and it made the </a:t>
+            </a:r>
+            <a:r>
+              <a:rPr lang="en-US" dirty="0" smtClean="0"/>
+              <a:t>course worthwhile.</a:t>
+            </a:r>
+          </a:p>
+          <a:p>
+            <a:r>
+              <a:rPr lang="en-US" dirty="0" smtClean="0"/>
+              <a:t>Pair </a:t>
+            </a:r>
+            <a:r>
+              <a:rPr lang="en-US" dirty="0"/>
+              <a:t>programming was a must for some projects as difference in </a:t>
+            </a:r>
+            <a:r>
+              <a:rPr lang="en-US" dirty="0" smtClean="0"/>
+              <a:t>schedules was a challenge </a:t>
+            </a:r>
+            <a:r>
+              <a:rPr lang="en-US" dirty="0"/>
+              <a:t>at times. This was tailored to real world scenarios </a:t>
+            </a:r>
+            <a:r>
+              <a:rPr lang="en-US" dirty="0" smtClean="0"/>
+              <a:t>and many </a:t>
+            </a:r>
+            <a:r>
+              <a:rPr lang="en-US" dirty="0"/>
+              <a:t>lessons learned from keeping to a schedule in software delivery</a:t>
+            </a:r>
+            <a:r>
+              <a:rPr lang="en-US" dirty="0" smtClean="0"/>
+              <a:t>.</a:t>
+            </a:r>
+          </a:p>
+          <a:p>
+            <a:r>
+              <a:rPr lang="en-US" dirty="0"/>
+              <a:t>Learning GitHub was interesting and fun, I will definitely be using </a:t>
+            </a:r>
+            <a:r>
+              <a:rPr lang="en-US" dirty="0" smtClean="0"/>
+              <a:t>more of </a:t>
+            </a:r>
+            <a:r>
+              <a:rPr lang="en-US" dirty="0"/>
+              <a:t>it to host future projects.</a:t>
+            </a:r>
+            <a:endParaRPr lang="en-US" dirty="0" smtClean="0"/>
+          </a:p>
+          <a:p>
+            <a:pPr marL="0" indent="0">
+              <a:buNone/>
+            </a:pPr>
+            <a:r>
+              <a:rPr lang="en-US" dirty="0" smtClean="0"/>
+              <a:t>- </a:t>
+            </a:r>
+            <a:r>
+              <a:rPr lang="en-US" sz="2400" dirty="0" smtClean="0"/>
+              <a:t>Luciano Avendano</a:t>
+            </a:r>
+          </a:p>
+        </p:txBody>
+      </p:sp>
+    </p:spTree>
+    <p:extLst>
+      <p:ext uri="{BB962C8B-B14F-4D97-AF65-F5344CB8AC3E}">
+        <p14:creationId xmlns:p14="http://schemas.microsoft.com/office/powerpoint/2010/main" val="2389995244"/>
+      </p:ext>
+    </p:extLst>
+  </p:cSld>
+  <p:clrMapOvr>
+    <a:masterClrMapping/>
+  </p:clrMapOvr>
+</p:sld>
+</file>
+
+<file path=ppt/slides/slide13.xml><?xml version="1.0" encoding="utf-8"?>
+<p:sld xmlns:a="http://schemas.openxmlformats.org/drawingml/2006/main" xmlns:r="http://schemas.openxmlformats.org/officeDocument/2006/relationships" xmlns:p="http://schemas.openxmlformats.org/presentationml/2006/main">
+  <p:cSld>
+    <p:spTree>
+      <p:nvGrpSpPr>
+        <p:cNvPr id="1" name=""/>
+        <p:cNvGrpSpPr/>
+        <p:nvPr/>
+      </p:nvGrpSpPr>
+      <p:grpSpPr>
+        <a:xfrm>
+          <a:off x="0" y="0"/>
+          <a:ext cx="0" cy="0"/>
+          <a:chOff x="0" y="0"/>
+          <a:chExt cx="0" cy="0"/>
+        </a:xfrm>
+      </p:grpSpPr>
+      <p:sp>
+        <p:nvSpPr>
+          <p:cNvPr id="2" name="Title 1"/>
+          <p:cNvSpPr>
+            <a:spLocks noGrp="1"/>
+          </p:cNvSpPr>
+          <p:nvPr>
+            <p:ph type="title"/>
+          </p:nvPr>
+        </p:nvSpPr>
+        <p:spPr/>
+        <p:txBody>
+          <a:bodyPr/>
+          <a:lstStyle/>
+          <a:p>
+            <a:r>
+              <a:rPr lang="en-US" dirty="0" smtClean="0"/>
               <a:t>Links</a:t>
             </a:r>
             <a:endParaRPr lang="en-US" dirty="0"/>
@@ -6016,14 +6409,38 @@
           <a:lstStyle/>
           <a:p>
             <a:r>
+              <a:rPr lang="en-US" dirty="0" smtClean="0">
+                <a:hlinkClick r:id="rId2"/>
+              </a:rPr>
+              <a:t>Group Project </a:t>
+            </a:r>
+            <a:r>
+              <a:rPr lang="en-US" dirty="0" smtClean="0">
+                <a:hlinkClick r:id="rId2"/>
+              </a:rPr>
+              <a:t>Status Document</a:t>
+            </a:r>
+            <a:endParaRPr lang="en-US" dirty="0" smtClean="0"/>
+          </a:p>
+          <a:p>
+            <a:r>
+              <a:rPr lang="en-US" dirty="0" smtClean="0">
+                <a:hlinkClick r:id="rId3"/>
+              </a:rPr>
+              <a:t>GitHub </a:t>
+            </a:r>
+            <a:r>
+              <a:rPr lang="en-US" dirty="0" smtClean="0">
+                <a:hlinkClick r:id="rId3"/>
+              </a:rPr>
+              <a:t>Repository</a:t>
+            </a:r>
+            <a:endParaRPr lang="en-US" dirty="0" smtClean="0"/>
+          </a:p>
+          <a:p>
+            <a:r>
               <a:rPr lang="en-US" dirty="0" smtClean="0"/>
-              <a:t>Group Status Document</a:t>
-            </a:r>
-          </a:p>
-          <a:p>
-            <a:r>
-              <a:rPr lang="en-US" dirty="0" smtClean="0"/>
-              <a:t>GitHub Repository</a:t>
+              <a:t>Project Video</a:t>
             </a:r>
             <a:endParaRPr lang="en-US" dirty="0"/>
           </a:p>
@@ -6157,25 +6574,34 @@
           </a:p>
         </p:txBody>
       </p:sp>
-      <p:sp>
-        <p:nvSpPr>
-          <p:cNvPr id="8" name="Content Placeholder 7"/>
-          <p:cNvSpPr>
-            <a:spLocks noGrp="1"/>
-          </p:cNvSpPr>
+      <p:pic>
+        <p:nvPicPr>
+          <p:cNvPr id="2" name="Content Placeholder 1"/>
+          <p:cNvPicPr>
+            <a:picLocks noGrp="1" noChangeAspect="1"/>
+          </p:cNvPicPr>
           <p:nvPr>
             <p:ph sz="quarter" idx="4"/>
           </p:nvPr>
-        </p:nvSpPr>
-        <p:spPr/>
-        <p:txBody>
-          <a:bodyPr/>
-          <a:lstStyle/>
-          <a:p>
-            <a:endParaRPr lang="en-US"/>
-          </a:p>
-        </p:txBody>
-      </p:sp>
+        </p:nvPicPr>
+        <p:blipFill rotWithShape="1">
+          <a:blip r:embed="rId3">
+            <a:extLst>
+              <a:ext uri="{28A0092B-C50C-407E-A947-70E740481C1C}">
+                <a14:useLocalDpi xmlns:a14="http://schemas.microsoft.com/office/drawing/2010/main" val="0"/>
+              </a:ext>
+            </a:extLst>
+          </a:blip>
+          <a:srcRect l="4194" r="17802"/>
+          <a:stretch/>
+        </p:blipFill>
+        <p:spPr>
+          <a:xfrm>
+            <a:off x="6955436" y="3132138"/>
+            <a:ext cx="3207896" cy="3086100"/>
+          </a:xfrm>
+        </p:spPr>
+      </p:pic>
     </p:spTree>
     <p:extLst>
       <p:ext uri="{BB962C8B-B14F-4D97-AF65-F5344CB8AC3E}">
@@ -6374,6 +6800,34 @@
           </a:p>
         </p:txBody>
       </p:sp>
+      <p:sp>
+        <p:nvSpPr>
+          <p:cNvPr id="4" name="Rectangle 3"/>
+          <p:cNvSpPr/>
+          <p:nvPr/>
+        </p:nvSpPr>
+        <p:spPr>
+          <a:xfrm>
+            <a:off x="3342682" y="3244334"/>
+            <a:ext cx="5506636" cy="369332"/>
+          </a:xfrm>
+          <a:prstGeom prst="rect">
+            <a:avLst/>
+          </a:prstGeom>
+        </p:spPr>
+        <p:txBody>
+          <a:bodyPr wrap="none">
+            <a:spAutoFit/>
+          </a:bodyPr>
+          <a:lstStyle/>
+          <a:p>
+            <a:r>
+              <a:rPr lang="en-US" dirty="0"/>
+              <a:t>https://github.com/ktkitkat/CST205-Final-Project</a:t>
+            </a:r>
+          </a:p>
+        </p:txBody>
+      </p:sp>
     </p:spTree>
     <p:extLst>
       <p:ext uri="{BB962C8B-B14F-4D97-AF65-F5344CB8AC3E}">
@@ -6421,49 +6875,165 @@
           <a:p>
             <a:r>
               <a:rPr lang="en-US" dirty="0" smtClean="0"/>
-              <a:t>Initial </a:t>
-            </a:r>
-            <a:r>
-              <a:rPr lang="en-US" dirty="0" err="1" smtClean="0"/>
-              <a:t>MapPing</a:t>
+              <a:t>Responsibilities</a:t>
             </a:r>
             <a:endParaRPr lang="en-US" dirty="0"/>
           </a:p>
         </p:txBody>
       </p:sp>
-      <p:pic>
-        <p:nvPicPr>
-          <p:cNvPr id="4" name="Content Placeholder 3"/>
-          <p:cNvPicPr>
-            <a:picLocks noGrp="1" noChangeAspect="1"/>
-          </p:cNvPicPr>
-          <p:nvPr>
-            <p:ph idx="1"/>
-          </p:nvPr>
-        </p:nvPicPr>
-        <p:blipFill>
-          <a:blip r:embed="rId2" cstate="print">
-            <a:extLst>
-              <a:ext uri="{28A0092B-C50C-407E-A947-70E740481C1C}">
-                <a14:useLocalDpi xmlns:a14="http://schemas.microsoft.com/office/drawing/2010/main" val="0"/>
-              </a:ext>
-            </a:extLst>
-          </a:blip>
-          <a:stretch>
-            <a:fillRect/>
-          </a:stretch>
-        </p:blipFill>
-        <p:spPr>
-          <a:xfrm>
-            <a:off x="2758230" y="2193925"/>
-            <a:ext cx="6675539" cy="4024313"/>
-          </a:xfrm>
-        </p:spPr>
-      </p:pic>
+      <p:sp>
+        <p:nvSpPr>
+          <p:cNvPr id="4" name="Text Placeholder 3"/>
+          <p:cNvSpPr>
+            <a:spLocks noGrp="1"/>
+          </p:cNvSpPr>
+          <p:nvPr>
+            <p:ph type="body" idx="1"/>
+          </p:nvPr>
+        </p:nvSpPr>
+        <p:spPr/>
+        <p:txBody>
+          <a:bodyPr>
+            <a:normAutofit/>
+          </a:bodyPr>
+          <a:lstStyle/>
+          <a:p>
+            <a:r>
+              <a:rPr lang="en-US" sz="3600" dirty="0" smtClean="0"/>
+              <a:t>Luciano </a:t>
+            </a:r>
+            <a:r>
+              <a:rPr lang="en-US" sz="3600" dirty="0" err="1" smtClean="0"/>
+              <a:t>Avendano</a:t>
+            </a:r>
+            <a:endParaRPr lang="en-US" sz="3600" dirty="0"/>
+          </a:p>
+        </p:txBody>
+      </p:sp>
+      <p:sp>
+        <p:nvSpPr>
+          <p:cNvPr id="3" name="Content Placeholder 2"/>
+          <p:cNvSpPr>
+            <a:spLocks noGrp="1"/>
+          </p:cNvSpPr>
+          <p:nvPr>
+            <p:ph sz="half" idx="2"/>
+          </p:nvPr>
+        </p:nvSpPr>
+        <p:spPr/>
+        <p:txBody>
+          <a:bodyPr>
+            <a:normAutofit/>
+          </a:bodyPr>
+          <a:lstStyle/>
+          <a:p>
+            <a:pPr lvl="1"/>
+            <a:r>
+              <a:rPr lang="en-US" sz="2800" dirty="0" smtClean="0"/>
+              <a:t>Initial Mapping</a:t>
+            </a:r>
+          </a:p>
+          <a:p>
+            <a:pPr lvl="1"/>
+            <a:r>
+              <a:rPr lang="en-US" sz="2800" dirty="0" smtClean="0"/>
+              <a:t>Picture Coding</a:t>
+            </a:r>
+          </a:p>
+          <a:p>
+            <a:pPr lvl="1"/>
+            <a:r>
+              <a:rPr lang="en-US" sz="2800" dirty="0" smtClean="0"/>
+              <a:t>Text Coding</a:t>
+            </a:r>
+          </a:p>
+          <a:p>
+            <a:pPr lvl="1"/>
+            <a:r>
+              <a:rPr lang="en-US" sz="2800" dirty="0" smtClean="0"/>
+              <a:t>Video Presentation</a:t>
+            </a:r>
+          </a:p>
+        </p:txBody>
+      </p:sp>
+      <p:sp>
+        <p:nvSpPr>
+          <p:cNvPr id="5" name="Text Placeholder 4"/>
+          <p:cNvSpPr>
+            <a:spLocks noGrp="1"/>
+          </p:cNvSpPr>
+          <p:nvPr>
+            <p:ph type="body" sz="quarter" idx="3"/>
+          </p:nvPr>
+        </p:nvSpPr>
+        <p:spPr/>
+        <p:txBody>
+          <a:bodyPr>
+            <a:normAutofit/>
+          </a:bodyPr>
+          <a:lstStyle/>
+          <a:p>
+            <a:r>
+              <a:rPr lang="en-US" sz="3600" dirty="0" smtClean="0"/>
+              <a:t>Caitlin Kuleck</a:t>
+            </a:r>
+            <a:endParaRPr lang="en-US" sz="3600" dirty="0"/>
+          </a:p>
+        </p:txBody>
+      </p:sp>
+      <p:sp>
+        <p:nvSpPr>
+          <p:cNvPr id="6" name="Content Placeholder 5"/>
+          <p:cNvSpPr>
+            <a:spLocks noGrp="1"/>
+          </p:cNvSpPr>
+          <p:nvPr>
+            <p:ph sz="quarter" idx="4"/>
+          </p:nvPr>
+        </p:nvSpPr>
+        <p:spPr/>
+        <p:txBody>
+          <a:bodyPr>
+            <a:normAutofit/>
+          </a:bodyPr>
+          <a:lstStyle/>
+          <a:p>
+            <a:pPr lvl="1"/>
+            <a:r>
+              <a:rPr lang="en-US" sz="2800" dirty="0"/>
+              <a:t>Final Mapping</a:t>
+            </a:r>
+          </a:p>
+          <a:p>
+            <a:pPr lvl="1"/>
+            <a:r>
+              <a:rPr lang="en-US" sz="2800" dirty="0"/>
+              <a:t>Game Planning</a:t>
+            </a:r>
+          </a:p>
+          <a:p>
+            <a:pPr lvl="1"/>
+            <a:r>
+              <a:rPr lang="en-US" sz="2800" dirty="0"/>
+              <a:t>Text Coding</a:t>
+            </a:r>
+          </a:p>
+          <a:p>
+            <a:pPr lvl="1"/>
+            <a:r>
+              <a:rPr lang="en-US" sz="2800" dirty="0"/>
+              <a:t>Video Script</a:t>
+            </a:r>
+          </a:p>
+          <a:p>
+            <a:endParaRPr lang="en-US" sz="2800" dirty="0"/>
+          </a:p>
+        </p:txBody>
+      </p:sp>
     </p:spTree>
     <p:extLst>
       <p:ext uri="{BB962C8B-B14F-4D97-AF65-F5344CB8AC3E}">
-        <p14:creationId xmlns:p14="http://schemas.microsoft.com/office/powerpoint/2010/main" val="1539846533"/>
+        <p14:creationId xmlns:p14="http://schemas.microsoft.com/office/powerpoint/2010/main" val="1043795730"/>
       </p:ext>
     </p:extLst>
   </p:cSld>
@@ -6507,7 +7077,11 @@
           <a:p>
             <a:r>
               <a:rPr lang="en-US" dirty="0" smtClean="0"/>
-              <a:t>In Progress Mapping</a:t>
+              <a:t>Initial </a:t>
+            </a:r>
+            <a:r>
+              <a:rPr lang="en-US" dirty="0" err="1" smtClean="0"/>
+              <a:t>MapPing</a:t>
             </a:r>
             <a:endParaRPr lang="en-US" dirty="0"/>
           </a:p>
@@ -6537,15 +7111,15 @@
         </p:blipFill>
         <p:spPr>
           <a:xfrm>
-            <a:off x="3447647" y="2193925"/>
-            <a:ext cx="5296706" cy="4024313"/>
+            <a:off x="2758230" y="2193925"/>
+            <a:ext cx="6675539" cy="4024313"/>
           </a:xfrm>
         </p:spPr>
       </p:pic>
     </p:spTree>
     <p:extLst>
       <p:ext uri="{BB962C8B-B14F-4D97-AF65-F5344CB8AC3E}">
-        <p14:creationId xmlns:p14="http://schemas.microsoft.com/office/powerpoint/2010/main" val="1499258909"/>
+        <p14:creationId xmlns:p14="http://schemas.microsoft.com/office/powerpoint/2010/main" val="1539846533"/>
       </p:ext>
     </p:extLst>
   </p:cSld>
@@ -6589,7 +7163,7 @@
           <a:p>
             <a:r>
               <a:rPr lang="en-US" dirty="0" smtClean="0"/>
-              <a:t>Final Mapping</a:t>
+              <a:t>In Progress Mapping</a:t>
             </a:r>
             <a:endParaRPr lang="en-US" dirty="0"/>
           </a:p>
@@ -6619,15 +7193,15 @@
         </p:blipFill>
         <p:spPr>
           <a:xfrm>
-            <a:off x="2758230" y="2193925"/>
-            <a:ext cx="6675539" cy="4024313"/>
+            <a:off x="3447647" y="2193925"/>
+            <a:ext cx="5296706" cy="4024313"/>
           </a:xfrm>
         </p:spPr>
       </p:pic>
     </p:spTree>
     <p:extLst>
       <p:ext uri="{BB962C8B-B14F-4D97-AF65-F5344CB8AC3E}">
-        <p14:creationId xmlns:p14="http://schemas.microsoft.com/office/powerpoint/2010/main" val="3326153022"/>
+        <p14:creationId xmlns:p14="http://schemas.microsoft.com/office/powerpoint/2010/main" val="1499258909"/>
       </p:ext>
     </p:extLst>
   </p:cSld>
@@ -6671,38 +7245,45 @@
           <a:p>
             <a:r>
               <a:rPr lang="en-US" dirty="0" smtClean="0"/>
-              <a:t>Results</a:t>
+              <a:t>Final Mapping</a:t>
             </a:r>
             <a:endParaRPr lang="en-US" dirty="0"/>
           </a:p>
         </p:txBody>
       </p:sp>
-      <p:sp>
-        <p:nvSpPr>
-          <p:cNvPr id="3" name="Content Placeholder 2"/>
-          <p:cNvSpPr>
-            <a:spLocks noGrp="1"/>
-          </p:cNvSpPr>
+      <p:pic>
+        <p:nvPicPr>
+          <p:cNvPr id="4" name="Content Placeholder 3"/>
+          <p:cNvPicPr>
+            <a:picLocks noGrp="1" noChangeAspect="1"/>
+          </p:cNvPicPr>
           <p:nvPr>
             <p:ph idx="1"/>
           </p:nvPr>
-        </p:nvSpPr>
-        <p:spPr/>
-        <p:txBody>
-          <a:bodyPr/>
-          <a:lstStyle/>
-          <a:p>
-            <a:r>
-              <a:rPr lang="en-US" dirty="0"/>
-              <a:t>Results - what have you achieved so far? explain this for each individual team member.</a:t>
-            </a:r>
-          </a:p>
-        </p:txBody>
-      </p:sp>
+        </p:nvPicPr>
+        <p:blipFill>
+          <a:blip r:embed="rId2" cstate="print">
+            <a:extLst>
+              <a:ext uri="{28A0092B-C50C-407E-A947-70E740481C1C}">
+                <a14:useLocalDpi xmlns:a14="http://schemas.microsoft.com/office/drawing/2010/main" val="0"/>
+              </a:ext>
+            </a:extLst>
+          </a:blip>
+          <a:stretch>
+            <a:fillRect/>
+          </a:stretch>
+        </p:blipFill>
+        <p:spPr>
+          <a:xfrm>
+            <a:off x="2758230" y="2193925"/>
+            <a:ext cx="6675539" cy="4024313"/>
+          </a:xfrm>
+        </p:spPr>
+      </p:pic>
     </p:spTree>
     <p:extLst>
       <p:ext uri="{BB962C8B-B14F-4D97-AF65-F5344CB8AC3E}">
-        <p14:creationId xmlns:p14="http://schemas.microsoft.com/office/powerpoint/2010/main" val="370495716"/>
+        <p14:creationId xmlns:p14="http://schemas.microsoft.com/office/powerpoint/2010/main" val="3326153022"/>
       </p:ext>
     </p:extLst>
   </p:cSld>
@@ -6746,7 +7327,7 @@
           <a:p>
             <a:r>
               <a:rPr lang="en-US" dirty="0" smtClean="0"/>
-              <a:t>Demonstration</a:t>
+              <a:t>Results</a:t>
             </a:r>
             <a:endParaRPr lang="en-US" dirty="0"/>
           </a:p>
@@ -6764,20 +7345,41 @@
         </p:nvSpPr>
         <p:spPr/>
         <p:txBody>
-          <a:bodyPr/>
-          <a:lstStyle/>
-          <a:p>
-            <a:r>
-              <a:rPr lang="en-US" dirty="0"/>
-              <a:t>Demo - can you demonstrate anything? add screenshots of your application running with descriptions</a:t>
-            </a:r>
+          <a:bodyPr>
+            <a:normAutofit/>
+          </a:bodyPr>
+          <a:lstStyle/>
+          <a:p>
+            <a:r>
+              <a:rPr lang="en-US" sz="2800" dirty="0" smtClean="0"/>
+              <a:t>Text game and photo manipulation goals were achieved.</a:t>
+            </a:r>
+          </a:p>
+          <a:p>
+            <a:r>
+              <a:rPr lang="en-US" sz="2800" dirty="0" smtClean="0"/>
+              <a:t>We were able to represent the skills we learned in class.</a:t>
+            </a:r>
+          </a:p>
+          <a:p>
+            <a:r>
+              <a:rPr lang="en-US" sz="2800" dirty="0" smtClean="0"/>
+              <a:t>We were able to incorporate string processing, image manipulation, and list building.</a:t>
+            </a:r>
+          </a:p>
+          <a:p>
+            <a:r>
+              <a:rPr lang="en-US" sz="2800" dirty="0" smtClean="0"/>
+              <a:t>All aspects of the game work very well and we are proud of our accomplishments.</a:t>
+            </a:r>
+            <a:endParaRPr lang="en-US" sz="2800" dirty="0"/>
           </a:p>
         </p:txBody>
       </p:sp>
     </p:spTree>
     <p:extLst>
       <p:ext uri="{BB962C8B-B14F-4D97-AF65-F5344CB8AC3E}">
-        <p14:creationId xmlns:p14="http://schemas.microsoft.com/office/powerpoint/2010/main" val="4118866213"/>
+        <p14:creationId xmlns:p14="http://schemas.microsoft.com/office/powerpoint/2010/main" val="370495716"/>
       </p:ext>
     </p:extLst>
   </p:cSld>

</xml_diff>